<commit_message>
Fixed errors in statistical tests.
</commit_message>
<xml_diff>
--- a/Workshops/Workshop6.pptx
+++ b/Workshops/Workshop6.pptx
@@ -5,7 +5,7 @@
     <p:sldMasterId id="2147483648" r:id="rId1"/>
   </p:sldMasterIdLst>
   <p:notesMasterIdLst>
-    <p:NotesMasterId r:id="rId46"/>
+    <p:NotesMasterId r:id="rId45"/>
   </p:notesMasterIdLst>
   <p:sldIdLst>
     <p:sldId id="256" r:id="rId2"/>
@@ -51,7 +51,6 @@
     <p:sldId id="296" r:id="rId42"/>
     <p:sldId id="297" r:id="rId43"/>
     <p:sldId id="298" r:id="rId44"/>
-    <p:sldId id="299" r:id="rId45"/>
   </p:sldIdLst>
   <p:sldSz cx="12192000" cy="6858000"/>
   <p:notesSz cx="6858000" cy="9144000"/>
@@ -831,7 +830,7 @@
             </a:pPr>
             <a:r>
               <a:rPr/>
-              <a:t>Again,</a:t>
+              <a:t>Quickly</a:t>
             </a:r>
             <a:r>
               <a:rPr/>
@@ -855,23 +854,39 @@
             </a:r>
             <a:r>
               <a:rPr/>
+              <a:t>main</a:t>
+            </a:r>
+            <a:r>
+              <a:rPr/>
+              <a:t> </a:t>
+            </a:r>
+            <a:r>
+              <a:rPr/>
+              <a:t>points</a:t>
+            </a:r>
+            <a:r>
+              <a:rPr/>
+              <a:t> </a:t>
+            </a:r>
+            <a:r>
+              <a:rPr/>
+              <a:t>of</a:t>
+            </a:r>
+            <a:r>
+              <a:rPr/>
+              <a:t> </a:t>
+            </a:r>
+            <a:r>
+              <a:rPr/>
+              <a:t>the</a:t>
+            </a:r>
+            <a:r>
+              <a:rPr/>
+              <a:t> </a:t>
+            </a:r>
+            <a:r>
+              <a:rPr/>
               <a:t>output</a:t>
-            </a:r>
-            <a:r>
-              <a:rPr/>
-              <a:t> </a:t>
-            </a:r>
-            <a:r>
-              <a:rPr/>
-              <a:t>from</a:t>
-            </a:r>
-            <a:r>
-              <a:rPr/>
-              <a:t> </a:t>
-            </a:r>
-            <a:r>
-              <a:rPr/>
-              <a:t>this.</a:t>
             </a:r>
           </a:p>
         </p:txBody>
@@ -893,7 +908,7 @@
           <a:p>
             <a:fld id="{18BDFEC3-8487-43E8-A154-7C12CBC1FFF2}" type="slidenum">
               <a:rPr lang="en-US"/>
-              <a:t>38</a:t>
+              <a:t>33</a:t>
             </a:fld>
             <a:endParaRPr lang="en-US"/>
           </a:p>
@@ -953,7 +968,55 @@
             </a:pPr>
             <a:r>
               <a:rPr/>
-              <a:t>Explain</a:t>
+              <a:t>Get</a:t>
+            </a:r>
+            <a:r>
+              <a:rPr/>
+              <a:t> </a:t>
+            </a:r>
+            <a:r>
+              <a:rPr/>
+              <a:t>them</a:t>
+            </a:r>
+            <a:r>
+              <a:rPr/>
+              <a:t> </a:t>
+            </a:r>
+            <a:r>
+              <a:rPr/>
+              <a:t>to</a:t>
+            </a:r>
+            <a:r>
+              <a:rPr/>
+              <a:t> </a:t>
+            </a:r>
+            <a:r>
+              <a:rPr/>
+              <a:t>do</a:t>
+            </a:r>
+            <a:r>
+              <a:rPr/>
+              <a:t> </a:t>
+            </a:r>
+            <a:r>
+              <a:rPr/>
+              <a:t>this,</a:t>
+            </a:r>
+            <a:r>
+              <a:rPr/>
+              <a:t> </a:t>
+            </a:r>
+            <a:r>
+              <a:rPr/>
+              <a:t>then</a:t>
+            </a:r>
+            <a:r>
+              <a:rPr/>
+              <a:t> </a:t>
+            </a:r>
+            <a:r>
+              <a:rPr/>
+              <a:t>explain</a:t>
             </a:r>
             <a:r>
               <a:rPr/>
@@ -969,7 +1032,7 @@
             </a:r>
             <a:r>
               <a:rPr/>
-              <a:t>output</a:t>
+              <a:t>output.</a:t>
             </a:r>
           </a:p>
         </p:txBody>
@@ -991,7 +1054,105 @@
           <a:p>
             <a:fld id="{18BDFEC3-8487-43E8-A154-7C12CBC1FFF2}" type="slidenum">
               <a:rPr lang="en-US"/>
-              <a:t>43</a:t>
+              <a:t>37</a:t>
+            </a:fld>
+            <a:endParaRPr lang="en-US"/>
+          </a:p>
+        </p:txBody>
+      </p:sp>
+    </p:spTree>
+  </p:cSld>
+</p:notes>
+</file>
+
+<file path=ppt/notesSlides/notesSlide12.xml><?xml version="1.0" encoding="utf-8"?>
+<p:notes xmlns:a="http://schemas.openxmlformats.org/drawingml/2006/main" xmlns:r="http://schemas.openxmlformats.org/officeDocument/2006/relationships" xmlns:p="http://schemas.openxmlformats.org/presentationml/2006/main">
+  <p:cSld>
+    <p:spTree>
+      <p:nvGrpSpPr>
+        <p:cNvPr id="1" name=""/>
+        <p:cNvGrpSpPr/>
+        <p:nvPr/>
+      </p:nvGrpSpPr>
+      <p:grpSpPr>
+        <a:xfrm>
+          <a:off x="0" y="0"/>
+          <a:ext cx="0" cy="0"/>
+          <a:chOff x="0" y="0"/>
+          <a:chExt cx="0" cy="0"/>
+        </a:xfrm>
+      </p:grpSpPr>
+      <p:sp>
+        <p:nvSpPr>
+          <p:cNvPr id="2" name="Slide Image Placeholder 1"/>
+          <p:cNvSpPr>
+            <a:spLocks noGrp="1" noRot="1" noChangeAspect="1"/>
+          </p:cNvSpPr>
+          <p:nvPr>
+            <p:ph type="sldImg"/>
+          </p:nvPr>
+        </p:nvSpPr>
+        <p:spPr/>
+      </p:sp>
+      <p:sp>
+        <p:nvSpPr>
+          <p:cNvPr id="3" name="Notes Placeholder 2"/>
+          <p:cNvSpPr>
+            <a:spLocks noGrp="1"/>
+          </p:cNvSpPr>
+          <p:nvPr>
+            <p:ph type="body" idx="1"/>
+          </p:nvPr>
+        </p:nvSpPr>
+        <p:spPr/>
+        <p:txBody>
+          <a:bodyPr/>
+          <a:lstStyle/>
+          <a:p>
+            <a:pPr lvl="0" marL="0" indent="0">
+              <a:buNone/>
+            </a:pPr>
+            <a:r>
+              <a:rPr/>
+              <a:t>Explain</a:t>
+            </a:r>
+            <a:r>
+              <a:rPr/>
+              <a:t> </a:t>
+            </a:r>
+            <a:r>
+              <a:rPr/>
+              <a:t>the</a:t>
+            </a:r>
+            <a:r>
+              <a:rPr/>
+              <a:t> </a:t>
+            </a:r>
+            <a:r>
+              <a:rPr/>
+              <a:t>output</a:t>
+            </a:r>
+          </a:p>
+        </p:txBody>
+      </p:sp>
+      <p:sp>
+        <p:nvSpPr>
+          <p:cNvPr id="4" name="Slide Number Placeholder 3"/>
+          <p:cNvSpPr>
+            <a:spLocks noGrp="1"/>
+          </p:cNvSpPr>
+          <p:nvPr>
+            <p:ph type="sldNum" sz="quarter" idx="10"/>
+          </p:nvPr>
+        </p:nvSpPr>
+        <p:spPr/>
+        <p:txBody>
+          <a:bodyPr/>
+          <a:lstStyle/>
+          <a:p>
+            <a:fld id="{18BDFEC3-8487-43E8-A154-7C12CBC1FFF2}" type="slidenum">
+              <a:rPr lang="en-US"/>
+              <a:t>42</a:t>
             </a:fld>
             <a:endParaRPr lang="en-US"/>
           </a:p>
@@ -1965,7 +2126,47 @@
             </a:pPr>
             <a:r>
               <a:rPr/>
-              <a:t>Note</a:t>
+              <a:t>Describe</a:t>
+            </a:r>
+            <a:r>
+              <a:rPr/>
+              <a:t> </a:t>
+            </a:r>
+            <a:r>
+              <a:rPr/>
+              <a:t>the</a:t>
+            </a:r>
+            <a:r>
+              <a:rPr/>
+              <a:t> </a:t>
+            </a:r>
+            <a:r>
+              <a:rPr/>
+              <a:t>golem</a:t>
+            </a:r>
+            <a:r>
+              <a:rPr/>
+              <a:t> </a:t>
+            </a:r>
+            <a:r>
+              <a:rPr/>
+              <a:t>story,</a:t>
+            </a:r>
+            <a:r>
+              <a:rPr/>
+              <a:t> </a:t>
+            </a:r>
+            <a:r>
+              <a:rPr/>
+              <a:t>and</a:t>
+            </a:r>
+            <a:r>
+              <a:rPr/>
+              <a:t> </a:t>
+            </a:r>
+            <a:r>
+              <a:rPr/>
+              <a:t>say</a:t>
             </a:r>
             <a:r>
               <a:rPr/>
@@ -1981,46 +2182,6 @@
             </a:r>
             <a:r>
               <a:rPr/>
-              <a:t>these</a:t>
-            </a:r>
-            <a:r>
-              <a:rPr/>
-              <a:t> </a:t>
-            </a:r>
-            <a:r>
-              <a:rPr/>
-              <a:t>number</a:t>
-            </a:r>
-            <a:r>
-              <a:rPr/>
-              <a:t> </a:t>
-            </a:r>
-            <a:r>
-              <a:rPr/>
-              <a:t>will</a:t>
-            </a:r>
-            <a:r>
-              <a:rPr/>
-              <a:t> </a:t>
-            </a:r>
-            <a:r>
-              <a:rPr/>
-              <a:t>not</a:t>
-            </a:r>
-            <a:r>
-              <a:rPr/>
-              <a:t> </a:t>
-            </a:r>
-            <a:r>
-              <a:rPr/>
-              <a:t>be</a:t>
-            </a:r>
-            <a:r>
-              <a:rPr/>
-              <a:t> </a:t>
-            </a:r>
-            <a:r>
-              <a:rPr/>
               <a:t>the</a:t>
             </a:r>
             <a:r>
@@ -2029,159 +2190,47 @@
             </a:r>
             <a:r>
               <a:rPr/>
-              <a:t>same</a:t>
-            </a:r>
-            <a:r>
-              <a:rPr/>
-              <a:t> </a:t>
-            </a:r>
-            <a:r>
-              <a:rPr/>
-              <a:t>as</a:t>
-            </a:r>
-            <a:r>
-              <a:rPr/>
-              <a:t> </a:t>
-            </a:r>
-            <a:r>
-              <a:rPr/>
-              <a:t>the</a:t>
-            </a:r>
-            <a:r>
-              <a:rPr/>
-              <a:t> </a:t>
-            </a:r>
-            <a:r>
-              <a:rPr/>
-              <a:t>one</a:t>
-            </a:r>
-            <a:r>
-              <a:rPr/>
-              <a:t> </a:t>
-            </a:r>
-            <a:r>
-              <a:rPr/>
-              <a:t>candidates</a:t>
-            </a:r>
-            <a:r>
-              <a:rPr/>
-              <a:t> </a:t>
-            </a:r>
-            <a:r>
-              <a:rPr/>
-              <a:t>see</a:t>
-            </a:r>
-            <a:r>
-              <a:rPr/>
-              <a:t> </a:t>
-            </a:r>
-            <a:r>
-              <a:rPr/>
-              <a:t>on</a:t>
-            </a:r>
-            <a:r>
-              <a:rPr/>
-              <a:t> </a:t>
-            </a:r>
-            <a:r>
-              <a:rPr/>
-              <a:t>their</a:t>
-            </a:r>
-            <a:r>
-              <a:rPr/>
-              <a:t> </a:t>
-            </a:r>
-            <a:r>
-              <a:rPr/>
-              <a:t>screens.</a:t>
-            </a:r>
-            <a:r>
-              <a:rPr/>
-              <a:t> </a:t>
-            </a:r>
-            <a:r>
-              <a:rPr/>
-              <a:t>These</a:t>
-            </a:r>
-            <a:r>
-              <a:rPr/>
-              <a:t> </a:t>
-            </a:r>
-            <a:r>
-              <a:rPr/>
-              <a:t>slides</a:t>
-            </a:r>
-            <a:r>
-              <a:rPr/>
-              <a:t> </a:t>
-            </a:r>
-            <a:r>
-              <a:rPr/>
-              <a:t>are</a:t>
-            </a:r>
-            <a:r>
-              <a:rPr/>
-              <a:t> </a:t>
-            </a:r>
-            <a:r>
-              <a:rPr/>
-              <a:t>based</a:t>
-            </a:r>
-            <a:r>
-              <a:rPr/>
-              <a:t> </a:t>
-            </a:r>
-            <a:r>
-              <a:rPr/>
-              <a:t>on</a:t>
-            </a:r>
-            <a:r>
-              <a:rPr/>
-              <a:t> </a:t>
-            </a:r>
-            <a:r>
-              <a:rPr/>
-              <a:t>a</a:t>
-            </a:r>
-            <a:r>
-              <a:rPr/>
-              <a:t> </a:t>
-            </a:r>
-            <a:r>
-              <a:rPr/>
-              <a:t>smaller</a:t>
-            </a:r>
-            <a:r>
-              <a:rPr/>
-              <a:t> </a:t>
-            </a:r>
-            <a:r>
-              <a:rPr/>
-              <a:t>version</a:t>
-            </a:r>
-            <a:r>
-              <a:rPr/>
-              <a:t> </a:t>
-            </a:r>
-            <a:r>
-              <a:rPr/>
-              <a:t>of</a:t>
-            </a:r>
-            <a:r>
-              <a:rPr/>
-              <a:t> </a:t>
-            </a:r>
-            <a:r>
-              <a:rPr/>
-              <a:t>the</a:t>
-            </a:r>
-            <a:r>
-              <a:rPr/>
-              <a:t> </a:t>
-            </a:r>
-            <a:r>
-              <a:rPr/>
-              <a:t>dataset.</a:t>
+              <a:t>book</a:t>
+            </a:r>
+            <a:r>
+              <a:rPr/>
+              <a:t> </a:t>
+            </a:r>
+            <a:r>
+              <a:rPr/>
+              <a:t>is</a:t>
+            </a:r>
+            <a:r>
+              <a:rPr/>
+              <a:t> </a:t>
+            </a:r>
+            <a:r>
+              <a:rPr/>
+              <a:t>good</a:t>
+            </a:r>
+            <a:r>
+              <a:rPr/>
+              <a:t> </a:t>
+            </a:r>
+            <a:r>
+              <a:rPr/>
+              <a:t>if</a:t>
+            </a:r>
+            <a:r>
+              <a:rPr/>
+              <a:t> </a:t>
+            </a:r>
+            <a:r>
+              <a:rPr/>
+              <a:t>you</a:t>
+            </a:r>
+            <a:r>
+              <a:rPr/>
+              <a:t> </a:t>
+            </a:r>
+            <a:r>
+              <a:rPr/>
+              <a:t>want.</a:t>
             </a:r>
           </a:p>
         </p:txBody>
@@ -2203,7 +2252,7 @@
           <a:p>
             <a:fld id="{18BDFEC3-8487-43E8-A154-7C12CBC1FFF2}" type="slidenum">
               <a:rPr lang="en-US"/>
-              <a:t>29</a:t>
+              <a:t>22</a:t>
             </a:fld>
             <a:endParaRPr lang="en-US"/>
           </a:p>
@@ -2263,47 +2312,7 @@
             </a:pPr>
             <a:r>
               <a:rPr/>
-              <a:t>Explain</a:t>
-            </a:r>
-            <a:r>
-              <a:rPr/>
-              <a:t> </a:t>
-            </a:r>
-            <a:r>
-              <a:rPr/>
-              <a:t>why</a:t>
-            </a:r>
-            <a:r>
-              <a:rPr/>
-              <a:t> </a:t>
-            </a:r>
-            <a:r>
-              <a:rPr/>
-              <a:t>this</a:t>
-            </a:r>
-            <a:r>
-              <a:rPr/>
-              <a:t> </a:t>
-            </a:r>
-            <a:r>
-              <a:rPr/>
-              <a:t>works.</a:t>
-            </a:r>
-            <a:r>
-              <a:rPr/>
-              <a:t> </a:t>
-            </a:r>
-            <a:r>
-              <a:rPr/>
-              <a:t>Also</a:t>
-            </a:r>
-            <a:r>
-              <a:rPr/>
-              <a:t> </a:t>
-            </a:r>
-            <a:r>
-              <a:rPr/>
-              <a:t>note</a:t>
+              <a:t>Note</a:t>
             </a:r>
             <a:r>
               <a:rPr/>
@@ -2319,6 +2328,46 @@
             </a:r>
             <a:r>
               <a:rPr/>
+              <a:t>these</a:t>
+            </a:r>
+            <a:r>
+              <a:rPr/>
+              <a:t> </a:t>
+            </a:r>
+            <a:r>
+              <a:rPr/>
+              <a:t>number</a:t>
+            </a:r>
+            <a:r>
+              <a:rPr/>
+              <a:t> </a:t>
+            </a:r>
+            <a:r>
+              <a:rPr/>
+              <a:t>may</a:t>
+            </a:r>
+            <a:r>
+              <a:rPr/>
+              <a:t> </a:t>
+            </a:r>
+            <a:r>
+              <a:rPr/>
+              <a:t>not</a:t>
+            </a:r>
+            <a:r>
+              <a:rPr/>
+              <a:t> </a:t>
+            </a:r>
+            <a:r>
+              <a:rPr/>
+              <a:t>be</a:t>
+            </a:r>
+            <a:r>
+              <a:rPr/>
+              <a:t> </a:t>
+            </a:r>
+            <a:r>
+              <a:rPr/>
               <a:t>the</a:t>
             </a:r>
             <a:r>
@@ -2327,39 +2376,15 @@
             </a:r>
             <a:r>
               <a:rPr/>
-              <a:t>number</a:t>
-            </a:r>
-            <a:r>
-              <a:rPr/>
-              <a:t> </a:t>
-            </a:r>
-            <a:r>
-              <a:rPr/>
-              <a:t>will</a:t>
-            </a:r>
-            <a:r>
-              <a:rPr/>
-              <a:t> </a:t>
-            </a:r>
-            <a:r>
-              <a:rPr/>
-              <a:t>not</a:t>
-            </a:r>
-            <a:r>
-              <a:rPr/>
-              <a:t> </a:t>
-            </a:r>
-            <a:r>
-              <a:rPr/>
-              <a:t>be</a:t>
-            </a:r>
-            <a:r>
-              <a:rPr/>
-              <a:t> </a:t>
-            </a:r>
-            <a:r>
-              <a:rPr/>
-              <a:t>exactly</a:t>
+              <a:t>same</a:t>
+            </a:r>
+            <a:r>
+              <a:rPr/>
+              <a:t> </a:t>
+            </a:r>
+            <a:r>
+              <a:rPr/>
+              <a:t>as</a:t>
             </a:r>
             <a:r>
               <a:rPr/>
@@ -2375,95 +2400,55 @@
             </a:r>
             <a:r>
               <a:rPr/>
-              <a:t>same</a:t>
-            </a:r>
-            <a:r>
-              <a:rPr/>
-              <a:t> </a:t>
-            </a:r>
-            <a:r>
-              <a:rPr/>
-              <a:t>as</a:t>
-            </a:r>
-            <a:r>
-              <a:rPr/>
-              <a:t> </a:t>
-            </a:r>
-            <a:r>
-              <a:rPr/>
-              <a:t>the</a:t>
-            </a:r>
-            <a:r>
-              <a:rPr/>
-              <a:t> </a:t>
-            </a:r>
-            <a:r>
-              <a:rPr/>
-              <a:t>the</a:t>
-            </a:r>
-            <a:r>
-              <a:rPr/>
-              <a:t> </a:t>
-            </a:r>
-            <a:r>
-              <a:rPr/>
-              <a:t>ones</a:t>
-            </a:r>
-            <a:r>
-              <a:rPr/>
-              <a:t> </a:t>
-            </a:r>
-            <a:r>
-              <a:rPr/>
-              <a:t>they</a:t>
-            </a:r>
-            <a:r>
-              <a:rPr/>
-              <a:t> </a:t>
-            </a:r>
-            <a:r>
-              <a:rPr/>
-              <a:t>will</a:t>
-            </a:r>
-            <a:r>
-              <a:rPr/>
-              <a:t> </a:t>
-            </a:r>
-            <a:r>
-              <a:rPr/>
-              <a:t>see.</a:t>
-            </a:r>
-            <a:r>
-              <a:rPr/>
-              <a:t> </a:t>
-            </a:r>
-            <a:r>
-              <a:rPr/>
-              <a:t>This</a:t>
-            </a:r>
-            <a:r>
-              <a:rPr/>
-              <a:t> </a:t>
-            </a:r>
-            <a:r>
-              <a:rPr/>
-              <a:t>is</a:t>
-            </a:r>
-            <a:r>
-              <a:rPr/>
-              <a:t> </a:t>
-            </a:r>
-            <a:r>
-              <a:rPr/>
-              <a:t>because</a:t>
-            </a:r>
-            <a:r>
-              <a:rPr/>
-              <a:t> </a:t>
-            </a:r>
-            <a:r>
-              <a:rPr/>
-              <a:t>these</a:t>
+              <a:t>one</a:t>
+            </a:r>
+            <a:r>
+              <a:rPr/>
+              <a:t> </a:t>
+            </a:r>
+            <a:r>
+              <a:rPr/>
+              <a:t>candidates</a:t>
+            </a:r>
+            <a:r>
+              <a:rPr/>
+              <a:t> </a:t>
+            </a:r>
+            <a:r>
+              <a:rPr/>
+              <a:t>see</a:t>
+            </a:r>
+            <a:r>
+              <a:rPr/>
+              <a:t> </a:t>
+            </a:r>
+            <a:r>
+              <a:rPr/>
+              <a:t>on</a:t>
+            </a:r>
+            <a:r>
+              <a:rPr/>
+              <a:t> </a:t>
+            </a:r>
+            <a:r>
+              <a:rPr/>
+              <a:t>their</a:t>
+            </a:r>
+            <a:r>
+              <a:rPr/>
+              <a:t> </a:t>
+            </a:r>
+            <a:r>
+              <a:rPr/>
+              <a:t>screens.</a:t>
+            </a:r>
+            <a:r>
+              <a:rPr/>
+              <a:t> </a:t>
+            </a:r>
+            <a:r>
+              <a:rPr/>
+              <a:t>These</a:t>
             </a:r>
             <a:r>
               <a:rPr/>
@@ -2487,7 +2472,15 @@
             </a:r>
             <a:r>
               <a:rPr/>
-              <a:t>using</a:t>
+              <a:t>based</a:t>
+            </a:r>
+            <a:r>
+              <a:rPr/>
+              <a:t> </a:t>
+            </a:r>
+            <a:r>
+              <a:rPr/>
+              <a:t>on</a:t>
             </a:r>
             <a:r>
               <a:rPr/>
@@ -2557,7 +2550,7 @@
           <a:p>
             <a:fld id="{18BDFEC3-8487-43E8-A154-7C12CBC1FFF2}" type="slidenum">
               <a:rPr lang="en-US"/>
-              <a:t>33</a:t>
+              <a:t>29</a:t>
             </a:fld>
             <a:endParaRPr lang="en-US"/>
           </a:p>
@@ -2617,63 +2610,39 @@
             </a:pPr>
             <a:r>
               <a:rPr/>
-              <a:t>Quickly</a:t>
-            </a:r>
-            <a:r>
-              <a:rPr/>
-              <a:t> </a:t>
-            </a:r>
-            <a:r>
-              <a:rPr/>
-              <a:t>explain</a:t>
-            </a:r>
-            <a:r>
-              <a:rPr/>
-              <a:t> </a:t>
-            </a:r>
-            <a:r>
-              <a:rPr/>
-              <a:t>the</a:t>
-            </a:r>
-            <a:r>
-              <a:rPr/>
-              <a:t> </a:t>
-            </a:r>
-            <a:r>
-              <a:rPr/>
-              <a:t>main</a:t>
-            </a:r>
-            <a:r>
-              <a:rPr/>
-              <a:t> </a:t>
-            </a:r>
-            <a:r>
-              <a:rPr/>
-              <a:t>points</a:t>
-            </a:r>
-            <a:r>
-              <a:rPr/>
-              <a:t> </a:t>
-            </a:r>
-            <a:r>
-              <a:rPr/>
-              <a:t>of</a:t>
-            </a:r>
-            <a:r>
-              <a:rPr/>
-              <a:t> </a:t>
-            </a:r>
-            <a:r>
-              <a:rPr/>
-              <a:t>the</a:t>
-            </a:r>
-            <a:r>
-              <a:rPr/>
-              <a:t> </a:t>
-            </a:r>
-            <a:r>
-              <a:rPr/>
-              <a:t>output</a:t>
+              <a:t>Tell</a:t>
+            </a:r>
+            <a:r>
+              <a:rPr/>
+              <a:t> </a:t>
+            </a:r>
+            <a:r>
+              <a:rPr/>
+              <a:t>them</a:t>
+            </a:r>
+            <a:r>
+              <a:rPr/>
+              <a:t> </a:t>
+            </a:r>
+            <a:r>
+              <a:rPr/>
+              <a:t>to</a:t>
+            </a:r>
+            <a:r>
+              <a:rPr/>
+              <a:t> </a:t>
+            </a:r>
+            <a:r>
+              <a:rPr/>
+              <a:t>do</a:t>
+            </a:r>
+            <a:r>
+              <a:rPr/>
+              <a:t> </a:t>
+            </a:r>
+            <a:r>
+              <a:rPr/>
+              <a:t>this.</a:t>
             </a:r>
           </a:p>
         </p:txBody>
@@ -2695,7 +2664,7 @@
           <a:p>
             <a:fld id="{18BDFEC3-8487-43E8-A154-7C12CBC1FFF2}" type="slidenum">
               <a:rPr lang="en-US"/>
-              <a:t>34</a:t>
+              <a:t>32</a:t>
             </a:fld>
             <a:endParaRPr lang="en-US"/>
           </a:p>
@@ -6250,7 +6219,7 @@
       </p:sp>
       <p:pic>
         <p:nvPicPr>
-          <p:cNvPr descr="Images/OrdinalData.png" id="0" name="Picture 1"/>
+          <p:cNvPr descr="../Images/OrdinalData.png" id="0" name="Picture 1"/>
           <p:cNvPicPr>
             <a:picLocks noGrp="1" noChangeAspect="1"/>
           </p:cNvPicPr>
@@ -6403,7 +6372,7 @@
       </p:sp>
       <p:pic>
         <p:nvPicPr>
-          <p:cNvPr descr="Images/IntervalData.png" id="0" name="Picture 1"/>
+          <p:cNvPr descr="../Images/IntervalData.png" id="0" name="Picture 1"/>
           <p:cNvPicPr>
             <a:picLocks noGrp="1" noChangeAspect="1"/>
           </p:cNvPicPr>
@@ -6723,7 +6692,7 @@
       </p:sp>
       <p:pic>
         <p:nvPicPr>
-          <p:cNvPr descr="Images/AgeDistribution.png" id="0" name="Picture 1"/>
+          <p:cNvPr descr="../Images/AgeDistribution.png" id="0" name="Picture 1"/>
           <p:cNvPicPr>
             <a:picLocks noGrp="1" noChangeAspect="1"/>
           </p:cNvPicPr>
@@ -6985,7 +6954,7 @@
       </p:sp>
       <p:pic>
         <p:nvPicPr>
-          <p:cNvPr descr="Images/HeightDistribution.png" id="0" name="Picture 1"/>
+          <p:cNvPr descr="../Images/HeightDistribution.png" id="0" name="Picture 1"/>
           <p:cNvPicPr>
             <a:picLocks noGrp="1" noChangeAspect="1"/>
           </p:cNvPicPr>
@@ -8342,7 +8311,7 @@
       </p:grpSpPr>
       <p:pic>
         <p:nvPicPr>
-          <p:cNvPr descr="Images/Clinician%20Coders%20Branding_FINAL_CMYK_Colour.png" id="0" name="Picture 1"/>
+          <p:cNvPr descr="../Images/Clinician%20Coders%20Branding_FINAL_CMYK_Colour.png" id="0" name="Picture 1"/>
           <p:cNvPicPr>
             <a:picLocks noGrp="1" noChangeAspect="1"/>
           </p:cNvPicPr>
@@ -8912,14 +8881,14 @@
       </p:sp>
       <p:pic>
         <p:nvPicPr>
-          <p:cNvPr descr="Images/Golem.png" id="0" name="Picture 1"/>
+          <p:cNvPr descr="../Images/Golem.png" id="0" name="Picture 1"/>
           <p:cNvPicPr>
             <a:picLocks noGrp="1" noChangeAspect="1"/>
           </p:cNvPicPr>
           <p:nvPr/>
         </p:nvPicPr>
         <p:blipFill>
-          <a:blip r:embed="rId2"/>
+          <a:blip r:embed="rId3"/>
           <a:stretch>
             <a:fillRect/>
           </a:stretch>
@@ -8942,14 +8911,14 @@
       </p:pic>
       <p:pic>
         <p:nvPicPr>
-          <p:cNvPr descr="Images/StatisticalRethinking.png" id="0" name="Picture 1"/>
+          <p:cNvPr descr="../Images/StatisticalRethinking.png" id="0" name="Picture 1"/>
           <p:cNvPicPr>
             <a:picLocks noGrp="1" noChangeAspect="1"/>
           </p:cNvPicPr>
           <p:nvPr/>
         </p:nvPicPr>
         <p:blipFill>
-          <a:blip r:embed="rId3"/>
+          <a:blip r:embed="rId4"/>
           <a:stretch>
             <a:fillRect/>
           </a:stretch>
@@ -9160,7 +9129,7 @@
       </p:sp>
       <p:pic>
         <p:nvPicPr>
-          <p:cNvPr descr="Images/pValue.png" id="0" name="Picture 1"/>
+          <p:cNvPr descr="../Images/pValue.png" id="0" name="Picture 1"/>
           <p:cNvPicPr>
             <a:picLocks noGrp="1" noChangeAspect="1"/>
           </p:cNvPicPr>
@@ -9275,7 +9244,7 @@
       </p:sp>
       <p:pic>
         <p:nvPicPr>
-          <p:cNvPr descr="Images/pValue2.png" id="0" name="Picture 1"/>
+          <p:cNvPr descr="../Images/pValue2.png" id="0" name="Picture 1"/>
           <p:cNvPicPr>
             <a:picLocks noGrp="1" noChangeAspect="1"/>
           </p:cNvPicPr>
@@ -10117,7 +10086,7 @@
       </p:sp>
       <p:pic>
         <p:nvPicPr>
-          <p:cNvPr descr="Images/Ttest.png" id="0" name="Picture 1"/>
+          <p:cNvPr descr="../Images/Ttest.png" id="0" name="Picture 1"/>
           <p:cNvPicPr>
             <a:picLocks noGrp="1" noChangeAspect="1"/>
           </p:cNvPicPr>
@@ -10355,15 +10324,6 @@
           <a:bodyPr/>
           <a:lstStyle/>
           <a:p>
-            <a:pPr lvl="0" marL="0" indent="0">
-              <a:buNone/>
-            </a:pPr>
-            <a:r>
-              <a:rPr/>
-              <a:t>Try:</a:t>
-            </a:r>
-          </a:p>
-          <a:p>
             <a:pPr lvl="0" marL="1270000" indent="0">
               <a:buNone/>
             </a:pPr>
@@ -10380,7 +10340,7 @@
               <a:rPr sz="1800">
                 <a:latin typeface="Courier"/>
               </a:rPr>
-              <a:t>(cchic</a:t>
+              <a:t>(height </a:t>
             </a:r>
             <a:r>
               <a:rPr sz="1800">
@@ -10389,81 +10349,37 @@
                 </a:solidFill>
                 <a:latin typeface="Courier"/>
               </a:rPr>
-              <a:t>$</a:t>
-            </a:r>
-            <a:r>
-              <a:rPr sz="1800">
-                <a:latin typeface="Courier"/>
-              </a:rPr>
-              <a:t>height, cchic</a:t>
+              <a:t>~</a:t>
             </a:r>
             <a:r>
               <a:rPr sz="1800">
                 <a:solidFill>
-                  <a:srgbClr val="666666"/>
+                  <a:srgbClr val="4070A0"/>
                 </a:solidFill>
                 <a:latin typeface="Courier"/>
               </a:rPr>
-              <a:t>$</a:t>
-            </a:r>
-            <a:r>
-              <a:rPr sz="1800">
-                <a:latin typeface="Courier"/>
-              </a:rPr>
-              <a:t>sex)</a:t>
-            </a:r>
-          </a:p>
-          <a:p>
-            <a:pPr lvl="0" marL="1270000" indent="0">
-              <a:buNone/>
-            </a:pPr>
-            <a:r>
-              <a:rPr sz="1800">
-                <a:latin typeface="Courier"/>
-              </a:rPr>
-              <a:t>## Warning in mean.default(y): argument is not numeric or logical: returning
-## NA</a:t>
-            </a:r>
-          </a:p>
-          <a:p>
-            <a:pPr lvl="0" marL="1270000" indent="0">
-              <a:buNone/>
-            </a:pPr>
-            <a:r>
-              <a:rPr sz="1800">
-                <a:latin typeface="Courier"/>
-              </a:rPr>
-              <a:t>## Warning in var(y): NAs introduced by coercion</a:t>
-            </a:r>
-          </a:p>
-          <a:p>
-            <a:pPr lvl="0" marL="1270000" indent="0">
-              <a:buNone/>
-            </a:pPr>
-            <a:r>
-              <a:rPr sz="1800">
-                <a:latin typeface="Courier"/>
-              </a:rPr>
-              <a:t>## Error in if (stderr &lt; 10 * .Machine$double.eps * max(abs(mx), abs(my))) stop("data are essentially constant"): missing value where TRUE/FALSE needed</a:t>
-            </a:r>
-          </a:p>
-          <a:p>
-            <a:pPr lvl="0" marL="0" indent="0">
-              <a:buNone/>
-            </a:pPr>
-            <a:r>
-              <a:rPr/>
-              <a:t>Notice the error. </a:t>
-            </a:r>
-            <a:r>
-              <a:rPr sz="1800">
-                <a:latin typeface="Courier"/>
-              </a:rPr>
-              <a:t>sex</a:t>
-            </a:r>
-            <a:r>
-              <a:rPr/>
-              <a:t> is in the wrong format.</a:t>
+              <a:t> </a:t>
+            </a:r>
+            <a:r>
+              <a:rPr sz="1800">
+                <a:latin typeface="Courier"/>
+              </a:rPr>
+              <a:t>sex, </a:t>
+            </a:r>
+            <a:r>
+              <a:rPr sz="1800">
+                <a:solidFill>
+                  <a:srgbClr val="902000"/>
+                </a:solidFill>
+                <a:latin typeface="Courier"/>
+              </a:rPr>
+              <a:t>data =</a:t>
+            </a:r>
+            <a:r>
+              <a:rPr sz="1800">
+                <a:latin typeface="Courier"/>
+              </a:rPr>
+              <a:t> cchic)</a:t>
             </a:r>
           </a:p>
         </p:txBody>
@@ -10524,7 +10440,7 @@
             </a:r>
             <a:r>
               <a:rPr/>
-              <a:t>a</a:t>
+              <a:t>the</a:t>
             </a:r>
             <a:r>
               <a:rPr/>
@@ -10558,225 +10474,24 @@
           <a:bodyPr/>
           <a:lstStyle/>
           <a:p>
-            <a:pPr lvl="0" marL="0" indent="0">
+            <a:pPr lvl="0" marL="1270000" indent="0">
               <a:buNone/>
             </a:pPr>
             <a:r>
-              <a:rPr/>
-              <a:t>Correct this by changing the format of this variable in R.</a:t>
-            </a:r>
-          </a:p>
-          <a:p>
-            <a:pPr lvl="0" marL="1270000" indent="0">
-              <a:buNone/>
-            </a:pPr>
-            <a:r>
-              <a:rPr sz="1800">
-                <a:latin typeface="Courier"/>
-              </a:rPr>
-              <a:t>cchic &lt;-</a:t>
-            </a:r>
-            <a:r>
-              <a:rPr sz="1800">
-                <a:solidFill>
-                  <a:srgbClr val="4070A0"/>
-                </a:solidFill>
-                <a:latin typeface="Courier"/>
-              </a:rPr>
-              <a:t> </a:t>
-            </a:r>
-            <a:r>
-              <a:rPr sz="1800">
-                <a:latin typeface="Courier"/>
-              </a:rPr>
-              <a:t>cchic </a:t>
-            </a:r>
-            <a:r>
-              <a:rPr sz="1800">
-                <a:solidFill>
-                  <a:srgbClr val="666666"/>
-                </a:solidFill>
-                <a:latin typeface="Courier"/>
-              </a:rPr>
-              <a:t>%&gt;%</a:t>
-            </a:r>
-            <a:br/>
-            <a:r>
-              <a:rPr sz="1800">
-                <a:solidFill>
-                  <a:srgbClr val="4070A0"/>
-                </a:solidFill>
-                <a:latin typeface="Courier"/>
-              </a:rPr>
-              <a:t>  </a:t>
-            </a:r>
-            <a:r>
-              <a:rPr sz="1800" b="1">
-                <a:solidFill>
-                  <a:srgbClr val="007020"/>
-                </a:solidFill>
-                <a:latin typeface="Courier"/>
-              </a:rPr>
-              <a:t>mutate</a:t>
-            </a:r>
-            <a:r>
-              <a:rPr sz="1800">
-                <a:latin typeface="Courier"/>
-              </a:rPr>
-              <a:t>(</a:t>
-            </a:r>
-            <a:r>
-              <a:rPr sz="1800">
-                <a:solidFill>
-                  <a:srgbClr val="902000"/>
-                </a:solidFill>
-                <a:latin typeface="Courier"/>
-              </a:rPr>
-              <a:t>gender =</a:t>
-            </a:r>
-            <a:r>
-              <a:rPr sz="1800">
-                <a:latin typeface="Courier"/>
-              </a:rPr>
-              <a:t> </a:t>
-            </a:r>
-            <a:r>
-              <a:rPr sz="1800" b="1">
-                <a:solidFill>
-                  <a:srgbClr val="007020"/>
-                </a:solidFill>
-                <a:latin typeface="Courier"/>
-              </a:rPr>
-              <a:t>as.factor</a:t>
-            </a:r>
-            <a:r>
-              <a:rPr sz="1800">
-                <a:latin typeface="Courier"/>
-              </a:rPr>
-              <a:t>(sex)) </a:t>
-            </a:r>
-            <a:r>
-              <a:rPr sz="1800">
-                <a:solidFill>
-                  <a:srgbClr val="666666"/>
-                </a:solidFill>
-                <a:latin typeface="Courier"/>
-              </a:rPr>
-              <a:t>%&gt;%</a:t>
-            </a:r>
-            <a:br/>
-            <a:r>
-              <a:rPr sz="1800">
-                <a:solidFill>
-                  <a:srgbClr val="4070A0"/>
-                </a:solidFill>
-                <a:latin typeface="Courier"/>
-              </a:rPr>
-              <a:t>  </a:t>
-            </a:r>
-            <a:r>
-              <a:rPr sz="1800" b="1">
-                <a:solidFill>
-                  <a:srgbClr val="007020"/>
-                </a:solidFill>
-                <a:latin typeface="Courier"/>
-              </a:rPr>
-              <a:t>mutate</a:t>
-            </a:r>
-            <a:r>
-              <a:rPr sz="1800">
-                <a:latin typeface="Courier"/>
-              </a:rPr>
-              <a:t>(</a:t>
-            </a:r>
-            <a:r>
-              <a:rPr sz="1800">
-                <a:solidFill>
-                  <a:srgbClr val="902000"/>
-                </a:solidFill>
-                <a:latin typeface="Courier"/>
-              </a:rPr>
-              <a:t>gender_num =</a:t>
-            </a:r>
-            <a:r>
-              <a:rPr sz="1800">
-                <a:latin typeface="Courier"/>
-              </a:rPr>
-              <a:t> </a:t>
-            </a:r>
-            <a:r>
-              <a:rPr sz="1800" b="1">
-                <a:solidFill>
-                  <a:srgbClr val="007020"/>
-                </a:solidFill>
-                <a:latin typeface="Courier"/>
-              </a:rPr>
-              <a:t>as.numeric</a:t>
-            </a:r>
-            <a:r>
-              <a:rPr sz="1800">
-                <a:latin typeface="Courier"/>
-              </a:rPr>
-              <a:t>(gender))</a:t>
-            </a:r>
-          </a:p>
-          <a:p>
-            <a:pPr lvl="0" marL="0" indent="0">
-              <a:buNone/>
-            </a:pPr>
-            <a:r>
-              <a:rPr/>
-              <a:t>Now do the test.</a:t>
-            </a:r>
-          </a:p>
-          <a:p>
-            <a:pPr lvl="0" marL="1270000" indent="0">
-              <a:buNone/>
-            </a:pPr>
-            <a:r>
-              <a:rPr sz="1800" b="1">
-                <a:solidFill>
-                  <a:srgbClr val="007020"/>
-                </a:solidFill>
-                <a:latin typeface="Courier"/>
-              </a:rPr>
-              <a:t>t.test</a:t>
-            </a:r>
-            <a:r>
-              <a:rPr sz="1800">
-                <a:latin typeface="Courier"/>
-              </a:rPr>
-              <a:t>(cchic</a:t>
-            </a:r>
-            <a:r>
-              <a:rPr sz="1800">
-                <a:solidFill>
-                  <a:srgbClr val="666666"/>
-                </a:solidFill>
-                <a:latin typeface="Courier"/>
-              </a:rPr>
-              <a:t>$</a:t>
-            </a:r>
-            <a:r>
-              <a:rPr sz="1800">
-                <a:latin typeface="Courier"/>
-              </a:rPr>
-              <a:t>height, cchic</a:t>
-            </a:r>
-            <a:r>
-              <a:rPr sz="1800">
-                <a:solidFill>
-                  <a:srgbClr val="666666"/>
-                </a:solidFill>
-                <a:latin typeface="Courier"/>
-              </a:rPr>
-              <a:t>$</a:t>
-            </a:r>
-            <a:r>
-              <a:rPr sz="1800">
-                <a:latin typeface="Courier"/>
-              </a:rPr>
-              <a:t>gender_num)</a:t>
+              <a:rPr sz="1800">
+                <a:latin typeface="Courier"/>
+              </a:rPr>
+              <a:t>## 
+##  Welch Two Sample t-test
+## 
+## data:  height by sex
+## t = -5.8997, df = 86.692, p-value = 6.88e-08
+## alternative hypothesis: true difference in means is not equal to 0
+## 95 percent confidence interval:
+##  -13.589546  -6.740124
+## sample estimates:
+## mean in group F mean in group M 
+##        162.6923        172.8571</a:t>
             </a:r>
           </a:p>
         </p:txBody>
@@ -10829,23 +10544,15 @@
             </a:pPr>
             <a:r>
               <a:rPr/>
-              <a:t>Doing</a:t>
-            </a:r>
-            <a:r>
-              <a:rPr/>
-              <a:t> </a:t>
-            </a:r>
-            <a:r>
-              <a:rPr/>
-              <a:t>the</a:t>
-            </a:r>
-            <a:r>
-              <a:rPr/>
-              <a:t> </a:t>
-            </a:r>
-            <a:r>
-              <a:rPr/>
-              <a:t>t-test</a:t>
+              <a:t>Comparing</a:t>
+            </a:r>
+            <a:r>
+              <a:rPr/>
+              <a:t> </a:t>
+            </a:r>
+            <a:r>
+              <a:rPr/>
+              <a:t>counts</a:t>
             </a:r>
           </a:p>
         </p:txBody>
@@ -10871,24 +10578,74 @@
           <a:bodyPr/>
           <a:lstStyle/>
           <a:p>
+            <a:pPr lvl="1"/>
+            <a:r>
+              <a:rPr/>
+              <a:t>Is survival different between genders?</a:t>
+            </a:r>
+          </a:p>
+          <a:p>
             <a:pPr lvl="0" marL="1270000" indent="0">
               <a:buNone/>
             </a:pPr>
             <a:r>
-              <a:rPr sz="1800">
-                <a:latin typeface="Courier"/>
-              </a:rPr>
-              <a:t>## 
-##  Welch Two Sample t-test
-## 
-## data:  cchic$height and cchic$gender_num
-## t = 167.77, df = 100.51, p-value &lt; 2.2e-16
-## alternative hypothesis: true difference in means is not equal to 0
-## 95 percent confidence interval:
-##  164.1740 168.1032
-## sample estimates:
-##  mean of x  mean of y 
-## 167.623762   1.485149</a:t>
+              <a:rPr sz="1800" b="1">
+                <a:solidFill>
+                  <a:srgbClr val="007020"/>
+                </a:solidFill>
+                <a:latin typeface="Courier"/>
+              </a:rPr>
+              <a:t>table</a:t>
+            </a:r>
+            <a:r>
+              <a:rPr sz="1800">
+                <a:latin typeface="Courier"/>
+              </a:rPr>
+              <a:t>(cchic</a:t>
+            </a:r>
+            <a:r>
+              <a:rPr sz="1800">
+                <a:solidFill>
+                  <a:srgbClr val="666666"/>
+                </a:solidFill>
+                <a:latin typeface="Courier"/>
+              </a:rPr>
+              <a:t>$</a:t>
+            </a:r>
+            <a:r>
+              <a:rPr sz="1800">
+                <a:latin typeface="Courier"/>
+              </a:rPr>
+              <a:t>sex, cchic</a:t>
+            </a:r>
+            <a:r>
+              <a:rPr sz="1800">
+                <a:solidFill>
+                  <a:srgbClr val="666666"/>
+                </a:solidFill>
+                <a:latin typeface="Courier"/>
+              </a:rPr>
+              <a:t>$</a:t>
+            </a:r>
+            <a:r>
+              <a:rPr sz="1800">
+                <a:latin typeface="Courier"/>
+              </a:rPr>
+              <a:t>vital_status)</a:t>
+            </a:r>
+          </a:p>
+          <a:p>
+            <a:pPr lvl="0" marL="1270000" indent="0">
+              <a:buNone/>
+            </a:pPr>
+            <a:r>
+              <a:rPr sz="1800">
+                <a:latin typeface="Courier"/>
+              </a:rPr>
+              <a:t>##    
+##      A  D
+##   F 46  6
+##   M 43  6</a:t>
             </a:r>
           </a:p>
         </p:txBody>
@@ -10941,15 +10698,31 @@
             </a:pPr>
             <a:r>
               <a:rPr/>
-              <a:t>Comparing</a:t>
-            </a:r>
-            <a:r>
-              <a:rPr/>
-              <a:t> </a:t>
-            </a:r>
-            <a:r>
-              <a:rPr/>
-              <a:t>counts</a:t>
+              <a:t>What</a:t>
+            </a:r>
+            <a:r>
+              <a:rPr/>
+              <a:t> </a:t>
+            </a:r>
+            <a:r>
+              <a:rPr/>
+              <a:t>is</a:t>
+            </a:r>
+            <a:r>
+              <a:rPr/>
+              <a:t> </a:t>
+            </a:r>
+            <a:r>
+              <a:rPr/>
+              <a:t>our</a:t>
+            </a:r>
+            <a:r>
+              <a:rPr/>
+              <a:t> </a:t>
+            </a:r>
+            <a:r>
+              <a:rPr/>
+              <a:t>hypothesis?</a:t>
             </a:r>
           </a:p>
         </p:txBody>
@@ -10978,71 +10751,28 @@
             <a:pPr lvl="1"/>
             <a:r>
               <a:rPr/>
-              <a:t>Is survival different between genders?</a:t>
-            </a:r>
-          </a:p>
-          <a:p>
-            <a:pPr lvl="0" marL="1270000" indent="0">
-              <a:buNone/>
-            </a:pPr>
-            <a:r>
-              <a:rPr sz="1800" b="1">
-                <a:solidFill>
-                  <a:srgbClr val="007020"/>
-                </a:solidFill>
-                <a:latin typeface="Courier"/>
-              </a:rPr>
-              <a:t>table</a:t>
-            </a:r>
-            <a:r>
-              <a:rPr sz="1800">
-                <a:latin typeface="Courier"/>
-              </a:rPr>
-              <a:t>(cchic</a:t>
-            </a:r>
-            <a:r>
-              <a:rPr sz="1800">
-                <a:solidFill>
-                  <a:srgbClr val="666666"/>
-                </a:solidFill>
-                <a:latin typeface="Courier"/>
-              </a:rPr>
-              <a:t>$</a:t>
-            </a:r>
-            <a:r>
-              <a:rPr sz="1800">
-                <a:latin typeface="Courier"/>
-              </a:rPr>
-              <a:t>gender, cchic</a:t>
-            </a:r>
-            <a:r>
-              <a:rPr sz="1800">
-                <a:solidFill>
-                  <a:srgbClr val="666666"/>
-                </a:solidFill>
-                <a:latin typeface="Courier"/>
-              </a:rPr>
-              <a:t>$</a:t>
-            </a:r>
-            <a:r>
-              <a:rPr sz="1800">
-                <a:latin typeface="Courier"/>
-              </a:rPr>
-              <a:t>vital_status)</a:t>
-            </a:r>
-          </a:p>
-          <a:p>
-            <a:pPr lvl="0" marL="1270000" indent="0">
-              <a:buNone/>
-            </a:pPr>
-            <a:r>
-              <a:rPr sz="1800">
-                <a:latin typeface="Courier"/>
-              </a:rPr>
-              <a:t>##    
-##      A  D
-##   F 46  6
-##   M 43  6</a:t>
+              <a:t>Null hypothesis</a:t>
+            </a:r>
+          </a:p>
+          <a:p>
+            <a:pPr lvl="2"/>
+            <a:r>
+              <a:rPr/>
+              <a:t>There is no difference in survival between men and women</a:t>
+            </a:r>
+          </a:p>
+          <a:p>
+            <a:pPr lvl="1"/>
+            <a:r>
+              <a:rPr/>
+              <a:t>Alternate hypothesis</a:t>
+            </a:r>
+          </a:p>
+          <a:p>
+            <a:pPr lvl="2"/>
+            <a:r>
+              <a:rPr/>
+              <a:t>There is a difference in survival between men and women</a:t>
             </a:r>
           </a:p>
         </p:txBody>
@@ -11095,31 +10825,39 @@
             </a:pPr>
             <a:r>
               <a:rPr/>
-              <a:t>What</a:t>
-            </a:r>
-            <a:r>
-              <a:rPr/>
-              <a:t> </a:t>
-            </a:r>
-            <a:r>
-              <a:rPr/>
-              <a:t>is</a:t>
-            </a:r>
-            <a:r>
-              <a:rPr/>
-              <a:t> </a:t>
-            </a:r>
-            <a:r>
-              <a:rPr/>
-              <a:t>our</a:t>
-            </a:r>
-            <a:r>
-              <a:rPr/>
-              <a:t> </a:t>
-            </a:r>
-            <a:r>
-              <a:rPr/>
-              <a:t>hypothesis?</a:t>
+              <a:t>Assumptions</a:t>
+            </a:r>
+            <a:r>
+              <a:rPr/>
+              <a:t> </a:t>
+            </a:r>
+            <a:r>
+              <a:rPr/>
+              <a:t>of</a:t>
+            </a:r>
+            <a:r>
+              <a:rPr/>
+              <a:t> </a:t>
+            </a:r>
+            <a:r>
+              <a:rPr/>
+              <a:t>the</a:t>
+            </a:r>
+            <a:r>
+              <a:rPr/>
+              <a:t> </a:t>
+            </a:r>
+            <a:r>
+              <a:rPr/>
+              <a:t>chi-squared</a:t>
+            </a:r>
+            <a:r>
+              <a:rPr/>
+              <a:t> </a:t>
+            </a:r>
+            <a:r>
+              <a:rPr/>
+              <a:t>test.</a:t>
             </a:r>
           </a:p>
         </p:txBody>
@@ -11145,31 +10883,76 @@
           <a:bodyPr/>
           <a:lstStyle/>
           <a:p>
-            <a:pPr lvl="1"/>
-            <a:r>
-              <a:rPr/>
-              <a:t>Null hypothesis</a:t>
-            </a:r>
-          </a:p>
-          <a:p>
-            <a:pPr lvl="2"/>
-            <a:r>
-              <a:rPr/>
-              <a:t>There is no difference in survival between men and women</a:t>
-            </a:r>
-          </a:p>
-          <a:p>
-            <a:pPr lvl="1"/>
-            <a:r>
-              <a:rPr/>
-              <a:t>Alternate hypothesis</a:t>
-            </a:r>
-          </a:p>
-          <a:p>
-            <a:pPr lvl="2"/>
-            <a:r>
-              <a:rPr/>
-              <a:t>There is a difference in survival between men and women</a:t>
+            <a:pPr lvl="1">
+              <a:buAutoNum type="arabicPeriod"/>
+            </a:pPr>
+            <a:r>
+              <a:rPr/>
+              <a:t>Data in cells should be frequencies or counts </a:t>
+            </a:r>
+            <a:r>
+              <a:rPr i="1"/>
+              <a:t>not</a:t>
+            </a:r>
+            <a:r>
+              <a:rPr/>
+              <a:t> percentages</a:t>
+            </a:r>
+          </a:p>
+          <a:p>
+            <a:pPr lvl="1">
+              <a:buAutoNum type="arabicPeriod"/>
+            </a:pPr>
+            <a:r>
+              <a:rPr/>
+              <a:t>Levels/Categories are mutually exclusive – here being a alive/dead applies</a:t>
+            </a:r>
+          </a:p>
+          <a:p>
+            <a:pPr lvl="1">
+              <a:buAutoNum type="arabicPeriod"/>
+            </a:pPr>
+            <a:r>
+              <a:rPr/>
+              <a:t>Each subject contributes to one cell – can either be male/female and alive/dead</a:t>
+            </a:r>
+          </a:p>
+          <a:p>
+            <a:pPr lvl="1">
+              <a:buAutoNum type="arabicPeriod"/>
+            </a:pPr>
+            <a:r>
+              <a:rPr/>
+              <a:t>Independent study groups</a:t>
+            </a:r>
+          </a:p>
+          <a:p>
+            <a:pPr lvl="1">
+              <a:buAutoNum type="arabicPeriod"/>
+            </a:pPr>
+            <a:r>
+              <a:rPr/>
+              <a:t>2 categorical variables</a:t>
+            </a:r>
+          </a:p>
+          <a:p>
+            <a:pPr lvl="1">
+              <a:buAutoNum type="arabicPeriod"/>
+            </a:pPr>
+            <a:r>
+              <a:rPr/>
+              <a:t>Values in each cell should be 5+</a:t>
+            </a:r>
+          </a:p>
+          <a:p>
+            <a:pPr lvl="0" marL="0" indent="0">
+              <a:buNone/>
+            </a:pPr>
+            <a:r>
+              <a:rPr sz="1800">
+                <a:latin typeface="Courier"/>
+              </a:rPr>
+              <a:t>Biochem Med (Zagreb). 2013 Jun; 23(2): 143–149.</a:t>
             </a:r>
           </a:p>
         </p:txBody>
@@ -11222,15 +11005,7 @@
             </a:pPr>
             <a:r>
               <a:rPr/>
-              <a:t>Assumptions</a:t>
-            </a:r>
-            <a:r>
-              <a:rPr/>
-              <a:t> </a:t>
-            </a:r>
-            <a:r>
-              <a:rPr/>
-              <a:t>of</a:t>
+              <a:t>Doing</a:t>
             </a:r>
             <a:r>
               <a:rPr/>
@@ -11280,76 +11055,193 @@
           <a:bodyPr/>
           <a:lstStyle/>
           <a:p>
-            <a:pPr lvl="1">
-              <a:buAutoNum type="arabicPeriod"/>
+            <a:pPr lvl="0" marL="0" indent="0">
+              <a:buNone/>
             </a:pPr>
             <a:r>
               <a:rPr/>
-              <a:t>Data in cells should be frequencies or counts </a:t>
-            </a:r>
-            <a:r>
-              <a:rPr i="1"/>
-              <a:t>not</a:t>
-            </a:r>
-            <a:r>
-              <a:rPr/>
-              <a:t> percentages</a:t>
-            </a:r>
-          </a:p>
-          <a:p>
-            <a:pPr lvl="1">
-              <a:buAutoNum type="arabicPeriod"/>
+              <a:t>Start with </a:t>
+            </a:r>
+            <a:r>
+              <a:rPr sz="1800">
+                <a:latin typeface="Courier"/>
+              </a:rPr>
+              <a:t>?chisq.test</a:t>
+            </a:r>
+            <a:r>
+              <a:rPr/>
+              <a:t>. Then do the test.</a:t>
+            </a:r>
+          </a:p>
+          <a:p>
+            <a:pPr lvl="0" marL="1270000" indent="0">
+              <a:buNone/>
             </a:pPr>
             <a:r>
-              <a:rPr/>
-              <a:t>Levels/Categories are mutually exclusive – here being a alive/dead applies</a:t>
-            </a:r>
-          </a:p>
-          <a:p>
-            <a:pPr lvl="1">
-              <a:buAutoNum type="arabicPeriod"/>
+              <a:rPr sz="1800" i="1">
+                <a:solidFill>
+                  <a:srgbClr val="60A0B0"/>
+                </a:solidFill>
+                <a:latin typeface="Courier"/>
+              </a:rPr>
+              <a:t># Changing the character vector to a factor one so that it works with the function.</a:t>
+            </a:r>
+            <a:br/>
+            <a:r>
+              <a:rPr sz="1800">
+                <a:latin typeface="Courier"/>
+              </a:rPr>
+              <a:t>cchic &lt;-</a:t>
+            </a:r>
+            <a:r>
+              <a:rPr sz="1800">
+                <a:solidFill>
+                  <a:srgbClr val="4070A0"/>
+                </a:solidFill>
+                <a:latin typeface="Courier"/>
+              </a:rPr>
+              <a:t> </a:t>
+            </a:r>
+            <a:r>
+              <a:rPr sz="1800">
+                <a:latin typeface="Courier"/>
+              </a:rPr>
+              <a:t>cchic </a:t>
+            </a:r>
+            <a:r>
+              <a:rPr sz="1800">
+                <a:solidFill>
+                  <a:srgbClr val="666666"/>
+                </a:solidFill>
+                <a:latin typeface="Courier"/>
+              </a:rPr>
+              <a:t>%&gt;%</a:t>
+            </a:r>
+            <a:br/>
+            <a:r>
+              <a:rPr sz="1800">
+                <a:solidFill>
+                  <a:srgbClr val="4070A0"/>
+                </a:solidFill>
+                <a:latin typeface="Courier"/>
+              </a:rPr>
+              <a:t>  </a:t>
+            </a:r>
+            <a:r>
+              <a:rPr sz="1800" b="1">
+                <a:solidFill>
+                  <a:srgbClr val="007020"/>
+                </a:solidFill>
+                <a:latin typeface="Courier"/>
+              </a:rPr>
+              <a:t>mutate</a:t>
+            </a:r>
+            <a:r>
+              <a:rPr sz="1800">
+                <a:latin typeface="Courier"/>
+              </a:rPr>
+              <a:t>(</a:t>
+            </a:r>
+            <a:r>
+              <a:rPr sz="1800">
+                <a:solidFill>
+                  <a:srgbClr val="902000"/>
+                </a:solidFill>
+                <a:latin typeface="Courier"/>
+              </a:rPr>
+              <a:t>gender =</a:t>
+            </a:r>
+            <a:r>
+              <a:rPr sz="1800">
+                <a:latin typeface="Courier"/>
+              </a:rPr>
+              <a:t> </a:t>
+            </a:r>
+            <a:r>
+              <a:rPr sz="1800" b="1">
+                <a:solidFill>
+                  <a:srgbClr val="007020"/>
+                </a:solidFill>
+                <a:latin typeface="Courier"/>
+              </a:rPr>
+              <a:t>as.factor</a:t>
+            </a:r>
+            <a:r>
+              <a:rPr sz="1800">
+                <a:latin typeface="Courier"/>
+              </a:rPr>
+              <a:t>(sex))</a:t>
+            </a:r>
+            <a:br/>
+            <a:r>
+              <a:rPr sz="1800" i="1">
+                <a:solidFill>
+                  <a:srgbClr val="60A0B0"/>
+                </a:solidFill>
+                <a:latin typeface="Courier"/>
+              </a:rPr>
+              <a:t># Doing the test.</a:t>
+            </a:r>
+            <a:br/>
+            <a:r>
+              <a:rPr sz="1800" b="1">
+                <a:solidFill>
+                  <a:srgbClr val="007020"/>
+                </a:solidFill>
+                <a:latin typeface="Courier"/>
+              </a:rPr>
+              <a:t>chisq.test</a:t>
+            </a:r>
+            <a:r>
+              <a:rPr sz="1800">
+                <a:latin typeface="Courier"/>
+              </a:rPr>
+              <a:t>(cchic</a:t>
+            </a:r>
+            <a:r>
+              <a:rPr sz="1800">
+                <a:solidFill>
+                  <a:srgbClr val="666666"/>
+                </a:solidFill>
+                <a:latin typeface="Courier"/>
+              </a:rPr>
+              <a:t>$</a:t>
+            </a:r>
+            <a:r>
+              <a:rPr sz="1800">
+                <a:latin typeface="Courier"/>
+              </a:rPr>
+              <a:t>gender, cchic</a:t>
+            </a:r>
+            <a:r>
+              <a:rPr sz="1800">
+                <a:solidFill>
+                  <a:srgbClr val="666666"/>
+                </a:solidFill>
+                <a:latin typeface="Courier"/>
+              </a:rPr>
+              <a:t>$</a:t>
+            </a:r>
+            <a:r>
+              <a:rPr sz="1800">
+                <a:latin typeface="Courier"/>
+              </a:rPr>
+              <a:t>vital_status)</a:t>
+            </a:r>
+          </a:p>
+          <a:p>
+            <a:pPr lvl="0" marL="1270000" indent="0">
+              <a:buNone/>
             </a:pPr>
             <a:r>
-              <a:rPr/>
-              <a:t>Each subject contributes to one cell – can either be male/female and alive/dead</a:t>
-            </a:r>
-          </a:p>
-          <a:p>
-            <a:pPr lvl="1">
-              <a:buAutoNum type="arabicPeriod"/>
-            </a:pPr>
-            <a:r>
-              <a:rPr/>
-              <a:t>Independent study groups</a:t>
-            </a:r>
-          </a:p>
-          <a:p>
-            <a:pPr lvl="1">
-              <a:buAutoNum type="arabicPeriod"/>
-            </a:pPr>
-            <a:r>
-              <a:rPr/>
-              <a:t>2 categorical variables</a:t>
-            </a:r>
-          </a:p>
-          <a:p>
-            <a:pPr lvl="1">
-              <a:buAutoNum type="arabicPeriod"/>
-            </a:pPr>
-            <a:r>
-              <a:rPr/>
-              <a:t>Values in each cell should be 5+</a:t>
-            </a:r>
-          </a:p>
-          <a:p>
-            <a:pPr lvl="0" marL="0" indent="0">
-              <a:buNone/>
-            </a:pPr>
-            <a:r>
-              <a:rPr sz="1800">
-                <a:latin typeface="Courier"/>
-              </a:rPr>
-              <a:t>Biochem Med (Zagreb). 2013 Jun; 23(2): 143–149.</a:t>
+              <a:rPr sz="1800">
+                <a:latin typeface="Courier"/>
+              </a:rPr>
+              <a:t>## 
+##  Pearson's Chi-squared test with Yates' continuity correction
+## 
+## data:  cchic$gender and cchic$vital_status
+## X-squared = 1.0527e-30, df = 1, p-value = 1</a:t>
             </a:r>
           </a:p>
         </p:txBody>
@@ -11402,31 +11294,23 @@
             </a:pPr>
             <a:r>
               <a:rPr/>
-              <a:t>Doing</a:t>
-            </a:r>
-            <a:r>
-              <a:rPr/>
-              <a:t> </a:t>
-            </a:r>
-            <a:r>
-              <a:rPr/>
-              <a:t>the</a:t>
-            </a:r>
-            <a:r>
-              <a:rPr/>
-              <a:t> </a:t>
-            </a:r>
-            <a:r>
-              <a:rPr/>
-              <a:t>chi-squared</a:t>
-            </a:r>
-            <a:r>
-              <a:rPr/>
-              <a:t> </a:t>
-            </a:r>
-            <a:r>
-              <a:rPr/>
-              <a:t>test.</a:t>
+              <a:t>Non</a:t>
+            </a:r>
+            <a:r>
+              <a:rPr/>
+              <a:t> </a:t>
+            </a:r>
+            <a:r>
+              <a:rPr/>
+              <a:t>paramteric</a:t>
+            </a:r>
+            <a:r>
+              <a:rPr/>
+              <a:t> </a:t>
+            </a:r>
+            <a:r>
+              <a:rPr/>
+              <a:t>versions</a:t>
             </a:r>
           </a:p>
         </p:txBody>
@@ -11457,82 +11341,7 @@
             </a:pPr>
             <a:r>
               <a:rPr/>
-              <a:t>Start with </a:t>
-            </a:r>
-            <a:r>
-              <a:rPr sz="1800">
-                <a:latin typeface="Courier"/>
-              </a:rPr>
-              <a:t>?chisq.test</a:t>
-            </a:r>
-            <a:r>
-              <a:rPr/>
-              <a:t>. Then do the test.</a:t>
-            </a:r>
-          </a:p>
-          <a:p>
-            <a:pPr lvl="0" marL="1270000" indent="0">
-              <a:buNone/>
-            </a:pPr>
-            <a:r>
-              <a:rPr sz="1800" b="1">
-                <a:solidFill>
-                  <a:srgbClr val="007020"/>
-                </a:solidFill>
-                <a:latin typeface="Courier"/>
-              </a:rPr>
-              <a:t>chisq.test</a:t>
-            </a:r>
-            <a:r>
-              <a:rPr sz="1800">
-                <a:latin typeface="Courier"/>
-              </a:rPr>
-              <a:t>(cchic</a:t>
-            </a:r>
-            <a:r>
-              <a:rPr sz="1800">
-                <a:solidFill>
-                  <a:srgbClr val="666666"/>
-                </a:solidFill>
-                <a:latin typeface="Courier"/>
-              </a:rPr>
-              <a:t>$</a:t>
-            </a:r>
-            <a:r>
-              <a:rPr sz="1800">
-                <a:latin typeface="Courier"/>
-              </a:rPr>
-              <a:t>gender, cchic</a:t>
-            </a:r>
-            <a:r>
-              <a:rPr sz="1800">
-                <a:solidFill>
-                  <a:srgbClr val="666666"/>
-                </a:solidFill>
-                <a:latin typeface="Courier"/>
-              </a:rPr>
-              <a:t>$</a:t>
-            </a:r>
-            <a:r>
-              <a:rPr sz="1800">
-                <a:latin typeface="Courier"/>
-              </a:rPr>
-              <a:t>vital_status)</a:t>
-            </a:r>
-          </a:p>
-          <a:p>
-            <a:pPr lvl="0" marL="1270000" indent="0">
-              <a:buNone/>
-            </a:pPr>
-            <a:r>
-              <a:rPr sz="1800">
-                <a:latin typeface="Courier"/>
-              </a:rPr>
-              <a:t>## 
-##  Pearson's Chi-squared test with Yates' continuity correction
-## 
-## data:  cchic$gender and cchic$vital_status
-## X-squared = 1.0527e-30, df = 1, p-value = 1</a:t>
+              <a:t>Is length of stay different between genders?</a:t>
             </a:r>
           </a:p>
         </p:txBody>
@@ -11559,214 +11368,9 @@
           <a:chExt cx="0" cy="0"/>
         </a:xfrm>
       </p:grpSpPr>
-      <p:sp>
-        <p:nvSpPr>
-          <p:cNvPr id="2" name="Title 1">
-            <a:extLst>
-              <a:ext uri="{FF2B5EF4-FFF2-40B4-BE49-F238E27FC236}">
-                <a16:creationId xmlns:a16="http://schemas.microsoft.com/office/drawing/2014/main" id="{5567D468-EE70-CD4E-A3AC-039CC11EF1FB}"/>
-              </a:ext>
-            </a:extLst>
-          </p:cNvPr>
-          <p:cNvSpPr>
-            <a:spLocks noGrp="1"/>
-          </p:cNvSpPr>
-          <p:nvPr>
-            <p:ph type="title"/>
-          </p:nvPr>
-        </p:nvSpPr>
-        <p:spPr/>
-        <p:txBody>
-          <a:bodyPr/>
-          <a:lstStyle/>
-          <a:p>
-            <a:pPr lvl="0" marL="0" indent="0">
-              <a:buNone/>
-            </a:pPr>
-            <a:r>
-              <a:rPr/>
-              <a:t>Non</a:t>
-            </a:r>
-            <a:r>
-              <a:rPr/>
-              <a:t> </a:t>
-            </a:r>
-            <a:r>
-              <a:rPr/>
-              <a:t>paramteric</a:t>
-            </a:r>
-            <a:r>
-              <a:rPr/>
-              <a:t> </a:t>
-            </a:r>
-            <a:r>
-              <a:rPr/>
-              <a:t>versions</a:t>
-            </a:r>
-          </a:p>
-        </p:txBody>
-      </p:sp>
-      <p:sp>
-        <p:nvSpPr>
-          <p:cNvPr id="3" name="Content Placeholder 2">
-            <a:extLst>
-              <a:ext uri="{FF2B5EF4-FFF2-40B4-BE49-F238E27FC236}">
-                <a16:creationId xmlns:a16="http://schemas.microsoft.com/office/drawing/2014/main" id="{D10DDA37-E46B-B641-BC9F-636CB92A2C08}"/>
-              </a:ext>
-            </a:extLst>
-          </p:cNvPr>
-          <p:cNvSpPr>
-            <a:spLocks noGrp="1"/>
-          </p:cNvSpPr>
-          <p:nvPr>
-            <p:ph idx="1"/>
-          </p:nvPr>
-        </p:nvSpPr>
-        <p:spPr/>
-        <p:txBody>
-          <a:bodyPr/>
-          <a:lstStyle/>
-          <a:p>
-            <a:pPr lvl="0" marL="0" indent="0">
-              <a:buNone/>
-            </a:pPr>
-            <a:r>
-              <a:rPr/>
-              <a:t>Is length of stay different between genders?</a:t>
-            </a:r>
-          </a:p>
-        </p:txBody>
-      </p:sp>
-    </p:spTree>
-  </p:cSld>
-</p:sld>
-</file>
-
-<file path=ppt/slides/slide4.xml><?xml version="1.0" encoding="utf-8"?>
-<p:sld xmlns:a="http://schemas.openxmlformats.org/drawingml/2006/main" xmlns:r="http://schemas.openxmlformats.org/officeDocument/2006/relationships" xmlns:p="http://schemas.openxmlformats.org/presentationml/2006/main">
-  <p:cSld>
-    <p:spTree>
-      <p:nvGrpSpPr>
-        <p:cNvPr id="1" name=""/>
-        <p:cNvGrpSpPr/>
-        <p:nvPr/>
-      </p:nvGrpSpPr>
-      <p:grpSpPr>
-        <a:xfrm>
-          <a:off x="0" y="0"/>
-          <a:ext cx="0" cy="0"/>
-          <a:chOff x="0" y="0"/>
-          <a:chExt cx="0" cy="0"/>
-        </a:xfrm>
-      </p:grpSpPr>
-      <p:sp>
-        <p:nvSpPr>
-          <p:cNvPr id="2" name="Title 1">
-            <a:extLst>
-              <a:ext uri="{FF2B5EF4-FFF2-40B4-BE49-F238E27FC236}">
-                <a16:creationId xmlns:a16="http://schemas.microsoft.com/office/drawing/2014/main" id="{5567D468-EE70-CD4E-A3AC-039CC11EF1FB}"/>
-              </a:ext>
-            </a:extLst>
-          </p:cNvPr>
-          <p:cNvSpPr>
-            <a:spLocks noGrp="1"/>
-          </p:cNvSpPr>
-          <p:nvPr>
-            <p:ph type="title"/>
-          </p:nvPr>
-        </p:nvSpPr>
-        <p:spPr/>
-        <p:txBody>
-          <a:bodyPr/>
-          <a:lstStyle/>
-          <a:p>
-            <a:pPr lvl="0" marL="0" indent="0">
-              <a:buNone/>
-            </a:pPr>
-            <a:r>
-              <a:rPr/>
-              <a:t>Wait!</a:t>
-            </a:r>
-          </a:p>
-        </p:txBody>
-      </p:sp>
-      <p:sp>
-        <p:nvSpPr>
-          <p:cNvPr id="3" name="Content Placeholder 2">
-            <a:extLst>
-              <a:ext uri="{FF2B5EF4-FFF2-40B4-BE49-F238E27FC236}">
-                <a16:creationId xmlns:a16="http://schemas.microsoft.com/office/drawing/2014/main" id="{D10DDA37-E46B-B641-BC9F-636CB92A2C08}"/>
-              </a:ext>
-            </a:extLst>
-          </p:cNvPr>
-          <p:cNvSpPr>
-            <a:spLocks noGrp="1"/>
-          </p:cNvSpPr>
-          <p:nvPr>
-            <p:ph idx="1"/>
-          </p:nvPr>
-        </p:nvSpPr>
-        <p:spPr/>
-        <p:txBody>
-          <a:bodyPr/>
-          <a:lstStyle/>
-          <a:p>
-            <a:pPr lvl="1"/>
-            <a:r>
-              <a:rPr/>
-              <a:t>Make sure </a:t>
-            </a:r>
-            <a:r>
-              <a:rPr sz="1800">
-                <a:latin typeface="Courier"/>
-              </a:rPr>
-              <a:t>cchic</a:t>
-            </a:r>
-            <a:r>
-              <a:rPr/>
-              <a:t> R dataframe from your work yesterday is loaded</a:t>
-            </a:r>
-          </a:p>
-          <a:p>
-            <a:pPr lvl="1"/>
-            <a:r>
-              <a:rPr/>
-              <a:t>Ensure this includes the variables you created including </a:t>
-            </a:r>
-            <a:r>
-              <a:rPr sz="1800">
-                <a:latin typeface="Courier"/>
-              </a:rPr>
-              <a:t>los</a:t>
-            </a:r>
-          </a:p>
-        </p:txBody>
-      </p:sp>
-    </p:spTree>
-  </p:cSld>
-</p:sld>
-</file>
-
-<file path=ppt/slides/slide40.xml><?xml version="1.0" encoding="utf-8"?>
-<p:sld xmlns:a="http://schemas.openxmlformats.org/drawingml/2006/main" xmlns:r="http://schemas.openxmlformats.org/officeDocument/2006/relationships" xmlns:p="http://schemas.openxmlformats.org/presentationml/2006/main">
-  <p:cSld>
-    <p:spTree>
-      <p:nvGrpSpPr>
-        <p:cNvPr id="1" name=""/>
-        <p:cNvGrpSpPr/>
-        <p:nvPr/>
-      </p:nvGrpSpPr>
-      <p:grpSpPr>
-        <a:xfrm>
-          <a:off x="0" y="0"/>
-          <a:ext cx="0" cy="0"/>
-          <a:chOff x="0" y="0"/>
-          <a:chExt cx="0" cy="0"/>
-        </a:xfrm>
-      </p:grpSpPr>
       <p:pic>
         <p:nvPicPr>
-          <p:cNvPr descr="Images/LOSMale.png" id="0" name="Picture 1"/>
+          <p:cNvPr descr="../Images/LOSMale.png" id="0" name="Picture 1"/>
           <p:cNvPicPr>
             <a:picLocks noGrp="1" noChangeAspect="1"/>
           </p:cNvPicPr>
@@ -11826,7 +11430,7 @@
       </p:sp>
       <p:pic>
         <p:nvPicPr>
-          <p:cNvPr descr="Images/LOSFemale.png" id="0" name="Picture 1"/>
+          <p:cNvPr descr="../Images/LOSFemale.png" id="0" name="Picture 1"/>
           <p:cNvPicPr>
             <a:picLocks noGrp="1" noChangeAspect="1"/>
           </p:cNvPicPr>
@@ -11889,6 +11493,276 @@
 </p:sld>
 </file>
 
+<file path=ppt/slides/slide4.xml><?xml version="1.0" encoding="utf-8"?>
+<p:sld xmlns:a="http://schemas.openxmlformats.org/drawingml/2006/main" xmlns:r="http://schemas.openxmlformats.org/officeDocument/2006/relationships" xmlns:p="http://schemas.openxmlformats.org/presentationml/2006/main">
+  <p:cSld>
+    <p:spTree>
+      <p:nvGrpSpPr>
+        <p:cNvPr id="1" name=""/>
+        <p:cNvGrpSpPr/>
+        <p:nvPr/>
+      </p:nvGrpSpPr>
+      <p:grpSpPr>
+        <a:xfrm>
+          <a:off x="0" y="0"/>
+          <a:ext cx="0" cy="0"/>
+          <a:chOff x="0" y="0"/>
+          <a:chExt cx="0" cy="0"/>
+        </a:xfrm>
+      </p:grpSpPr>
+      <p:sp>
+        <p:nvSpPr>
+          <p:cNvPr id="2" name="Title 1">
+            <a:extLst>
+              <a:ext uri="{FF2B5EF4-FFF2-40B4-BE49-F238E27FC236}">
+                <a16:creationId xmlns:a16="http://schemas.microsoft.com/office/drawing/2014/main" id="{5567D468-EE70-CD4E-A3AC-039CC11EF1FB}"/>
+              </a:ext>
+            </a:extLst>
+          </p:cNvPr>
+          <p:cNvSpPr>
+            <a:spLocks noGrp="1"/>
+          </p:cNvSpPr>
+          <p:nvPr>
+            <p:ph type="title"/>
+          </p:nvPr>
+        </p:nvSpPr>
+        <p:spPr/>
+        <p:txBody>
+          <a:bodyPr/>
+          <a:lstStyle/>
+          <a:p>
+            <a:pPr lvl="0" marL="0" indent="0">
+              <a:buNone/>
+            </a:pPr>
+            <a:r>
+              <a:rPr/>
+              <a:t>Wait!</a:t>
+            </a:r>
+          </a:p>
+        </p:txBody>
+      </p:sp>
+      <p:sp>
+        <p:nvSpPr>
+          <p:cNvPr id="3" name="Content Placeholder 2">
+            <a:extLst>
+              <a:ext uri="{FF2B5EF4-FFF2-40B4-BE49-F238E27FC236}">
+                <a16:creationId xmlns:a16="http://schemas.microsoft.com/office/drawing/2014/main" id="{D10DDA37-E46B-B641-BC9F-636CB92A2C08}"/>
+              </a:ext>
+            </a:extLst>
+          </p:cNvPr>
+          <p:cNvSpPr>
+            <a:spLocks noGrp="1"/>
+          </p:cNvSpPr>
+          <p:nvPr>
+            <p:ph idx="1"/>
+          </p:nvPr>
+        </p:nvSpPr>
+        <p:spPr/>
+        <p:txBody>
+          <a:bodyPr/>
+          <a:lstStyle/>
+          <a:p>
+            <a:pPr lvl="1"/>
+            <a:r>
+              <a:rPr/>
+              <a:t>Make sure </a:t>
+            </a:r>
+            <a:r>
+              <a:rPr sz="1800">
+                <a:latin typeface="Courier"/>
+              </a:rPr>
+              <a:t>cchic</a:t>
+            </a:r>
+            <a:r>
+              <a:rPr/>
+              <a:t> R dataframe from your work yesterday is loaded</a:t>
+            </a:r>
+          </a:p>
+          <a:p>
+            <a:pPr lvl="1"/>
+            <a:r>
+              <a:rPr/>
+              <a:t>Ensure this includes the variables you created including </a:t>
+            </a:r>
+            <a:r>
+              <a:rPr sz="1800">
+                <a:latin typeface="Courier"/>
+              </a:rPr>
+              <a:t>los</a:t>
+            </a:r>
+          </a:p>
+        </p:txBody>
+      </p:sp>
+    </p:spTree>
+  </p:cSld>
+</p:sld>
+</file>
+
+<file path=ppt/slides/slide40.xml><?xml version="1.0" encoding="utf-8"?>
+<p:sld xmlns:a="http://schemas.openxmlformats.org/drawingml/2006/main" xmlns:r="http://schemas.openxmlformats.org/officeDocument/2006/relationships" xmlns:p="http://schemas.openxmlformats.org/presentationml/2006/main">
+  <p:cSld>
+    <p:spTree>
+      <p:nvGrpSpPr>
+        <p:cNvPr id="1" name=""/>
+        <p:cNvGrpSpPr/>
+        <p:nvPr/>
+      </p:nvGrpSpPr>
+      <p:grpSpPr>
+        <a:xfrm>
+          <a:off x="0" y="0"/>
+          <a:ext cx="0" cy="0"/>
+          <a:chOff x="0" y="0"/>
+          <a:chExt cx="0" cy="0"/>
+        </a:xfrm>
+      </p:grpSpPr>
+      <p:sp>
+        <p:nvSpPr>
+          <p:cNvPr id="2" name="Title 1">
+            <a:extLst>
+              <a:ext uri="{FF2B5EF4-FFF2-40B4-BE49-F238E27FC236}">
+                <a16:creationId xmlns:a16="http://schemas.microsoft.com/office/drawing/2014/main" id="{5567D468-EE70-CD4E-A3AC-039CC11EF1FB}"/>
+              </a:ext>
+            </a:extLst>
+          </p:cNvPr>
+          <p:cNvSpPr>
+            <a:spLocks noGrp="1"/>
+          </p:cNvSpPr>
+          <p:nvPr>
+            <p:ph type="title"/>
+          </p:nvPr>
+        </p:nvSpPr>
+        <p:spPr/>
+        <p:txBody>
+          <a:bodyPr/>
+          <a:lstStyle/>
+          <a:p>
+            <a:pPr lvl="0" marL="0" indent="0">
+              <a:buNone/>
+            </a:pPr>
+            <a:r>
+              <a:rPr/>
+              <a:t>When</a:t>
+            </a:r>
+            <a:r>
+              <a:rPr/>
+              <a:t> </a:t>
+            </a:r>
+            <a:r>
+              <a:rPr/>
+              <a:t>do</a:t>
+            </a:r>
+            <a:r>
+              <a:rPr/>
+              <a:t> </a:t>
+            </a:r>
+            <a:r>
+              <a:rPr/>
+              <a:t>you</a:t>
+            </a:r>
+            <a:r>
+              <a:rPr/>
+              <a:t> </a:t>
+            </a:r>
+            <a:r>
+              <a:rPr/>
+              <a:t>use</a:t>
+            </a:r>
+            <a:r>
+              <a:rPr/>
+              <a:t> </a:t>
+            </a:r>
+            <a:r>
+              <a:rPr/>
+              <a:t>a</a:t>
+            </a:r>
+            <a:r>
+              <a:rPr/>
+              <a:t> </a:t>
+            </a:r>
+            <a:r>
+              <a:rPr/>
+              <a:t>non-parametric</a:t>
+            </a:r>
+            <a:r>
+              <a:rPr/>
+              <a:t> </a:t>
+            </a:r>
+            <a:r>
+              <a:rPr/>
+              <a:t>test?</a:t>
+            </a:r>
+          </a:p>
+        </p:txBody>
+      </p:sp>
+      <p:sp>
+        <p:nvSpPr>
+          <p:cNvPr id="3" name="Content Placeholder 2">
+            <a:extLst>
+              <a:ext uri="{FF2B5EF4-FFF2-40B4-BE49-F238E27FC236}">
+                <a16:creationId xmlns:a16="http://schemas.microsoft.com/office/drawing/2014/main" id="{D10DDA37-E46B-B641-BC9F-636CB92A2C08}"/>
+              </a:ext>
+            </a:extLst>
+          </p:cNvPr>
+          <p:cNvSpPr>
+            <a:spLocks noGrp="1"/>
+          </p:cNvSpPr>
+          <p:nvPr>
+            <p:ph idx="1"/>
+          </p:nvPr>
+        </p:nvSpPr>
+        <p:spPr/>
+        <p:txBody>
+          <a:bodyPr/>
+          <a:lstStyle/>
+          <a:p>
+            <a:pPr lvl="1"/>
+            <a:r>
+              <a:rPr/>
+              <a:t>When any of the the following are true.</a:t>
+            </a:r>
+          </a:p>
+          <a:p>
+            <a:pPr lvl="2"/>
+            <a:r>
+              <a:rPr/>
+              <a:t>Level of measurement is nominal or ordinal</a:t>
+            </a:r>
+          </a:p>
+          <a:p>
+            <a:pPr lvl="2"/>
+            <a:r>
+              <a:rPr/>
+              <a:t>Unequal sample sizes</a:t>
+            </a:r>
+          </a:p>
+          <a:p>
+            <a:pPr lvl="2"/>
+            <a:r>
+              <a:rPr/>
+              <a:t>Skewed data</a:t>
+            </a:r>
+          </a:p>
+          <a:p>
+            <a:pPr lvl="2"/>
+            <a:r>
+              <a:rPr/>
+              <a:t>Unequal variance</a:t>
+            </a:r>
+          </a:p>
+          <a:p>
+            <a:pPr lvl="2"/>
+            <a:r>
+              <a:rPr/>
+              <a:t>Continuous data collapsed into small number of categories</a:t>
+            </a:r>
+          </a:p>
+        </p:txBody>
+      </p:sp>
+    </p:spTree>
+  </p:cSld>
+</p:sld>
+</file>
+
 <file path=ppt/slides/slide41.xml><?xml version="1.0" encoding="utf-8"?>
 <p:sld xmlns:a="http://schemas.openxmlformats.org/drawingml/2006/main" xmlns:r="http://schemas.openxmlformats.org/officeDocument/2006/relationships" xmlns:p="http://schemas.openxmlformats.org/presentationml/2006/main">
   <p:cSld>
@@ -11932,55 +11806,39 @@
             </a:pPr>
             <a:r>
               <a:rPr/>
-              <a:t>When</a:t>
-            </a:r>
-            <a:r>
-              <a:rPr/>
-              <a:t> </a:t>
-            </a:r>
-            <a:r>
-              <a:rPr/>
-              <a:t>do</a:t>
-            </a:r>
-            <a:r>
-              <a:rPr/>
-              <a:t> </a:t>
-            </a:r>
-            <a:r>
-              <a:rPr/>
-              <a:t>you</a:t>
-            </a:r>
-            <a:r>
-              <a:rPr/>
-              <a:t> </a:t>
-            </a:r>
-            <a:r>
-              <a:rPr/>
-              <a:t>use</a:t>
-            </a:r>
-            <a:r>
-              <a:rPr/>
-              <a:t> </a:t>
-            </a:r>
-            <a:r>
-              <a:rPr/>
-              <a:t>a</a:t>
-            </a:r>
-            <a:r>
-              <a:rPr/>
-              <a:t> </a:t>
-            </a:r>
-            <a:r>
-              <a:rPr/>
-              <a:t>non-parametric</a:t>
-            </a:r>
-            <a:r>
-              <a:rPr/>
-              <a:t> </a:t>
-            </a:r>
-            <a:r>
-              <a:rPr/>
-              <a:t>test?</a:t>
+              <a:t>Using</a:t>
+            </a:r>
+            <a:r>
+              <a:rPr/>
+              <a:t> </a:t>
+            </a:r>
+            <a:r>
+              <a:rPr/>
+              <a:t>the</a:t>
+            </a:r>
+            <a:r>
+              <a:rPr/>
+              <a:t> </a:t>
+            </a:r>
+            <a:r>
+              <a:rPr/>
+              <a:t>Mann</a:t>
+            </a:r>
+            <a:r>
+              <a:rPr/>
+              <a:t> </a:t>
+            </a:r>
+            <a:r>
+              <a:rPr/>
+              <a:t>Whitney</a:t>
+            </a:r>
+            <a:r>
+              <a:rPr/>
+              <a:t> </a:t>
+            </a:r>
+            <a:r>
+              <a:rPr/>
+              <a:t>test</a:t>
             </a:r>
           </a:p>
         </p:txBody>
@@ -12006,45 +11864,127 @@
           <a:bodyPr/>
           <a:lstStyle/>
           <a:p>
-            <a:pPr lvl="1"/>
-            <a:r>
-              <a:rPr/>
-              <a:t>When any of the the following are true.</a:t>
-            </a:r>
-          </a:p>
-          <a:p>
-            <a:pPr lvl="2"/>
-            <a:r>
-              <a:rPr/>
-              <a:t>Level of measurement is nominal or ordinal</a:t>
-            </a:r>
-          </a:p>
-          <a:p>
-            <a:pPr lvl="2"/>
-            <a:r>
-              <a:rPr/>
-              <a:t>Unequal sample sizes</a:t>
-            </a:r>
-          </a:p>
-          <a:p>
-            <a:pPr lvl="2"/>
-            <a:r>
-              <a:rPr/>
-              <a:t>Skewed data</a:t>
-            </a:r>
-          </a:p>
-          <a:p>
-            <a:pPr lvl="2"/>
-            <a:r>
-              <a:rPr/>
-              <a:t>Unequal variance</a:t>
-            </a:r>
-          </a:p>
-          <a:p>
-            <a:pPr lvl="2"/>
-            <a:r>
-              <a:rPr/>
-              <a:t>Continuous data collapsed into small number of categories</a:t>
+            <a:pPr lvl="0" marL="0" indent="0">
+              <a:buNone/>
+            </a:pPr>
+            <a:r>
+              <a:rPr sz="1800">
+                <a:latin typeface="Courier"/>
+              </a:rPr>
+              <a:t>??Mann-Whitney</a:t>
+            </a:r>
+            <a:r>
+              <a:rPr/>
+              <a:t> will show you that the command is actually called </a:t>
+            </a:r>
+            <a:r>
+              <a:rPr sz="1800">
+                <a:latin typeface="Courier"/>
+              </a:rPr>
+              <a:t>wilcox.test</a:t>
+            </a:r>
+            <a:r>
+              <a:rPr/>
+              <a:t>.</a:t>
+            </a:r>
+          </a:p>
+          <a:p>
+            <a:pPr lvl="0" marL="0" indent="0">
+              <a:buNone/>
+            </a:pPr>
+            <a:r>
+              <a:rPr/>
+              <a:t>Both variables need to be in numeric format.</a:t>
+            </a:r>
+          </a:p>
+          <a:p>
+            <a:pPr lvl="0" marL="1270000" indent="0">
+              <a:buNone/>
+            </a:pPr>
+            <a:r>
+              <a:rPr sz="1800">
+                <a:latin typeface="Courier"/>
+              </a:rPr>
+              <a:t>cchic &lt;-</a:t>
+            </a:r>
+            <a:r>
+              <a:rPr sz="1800">
+                <a:solidFill>
+                  <a:srgbClr val="4070A0"/>
+                </a:solidFill>
+                <a:latin typeface="Courier"/>
+              </a:rPr>
+              <a:t> </a:t>
+            </a:r>
+            <a:r>
+              <a:rPr sz="1800">
+                <a:latin typeface="Courier"/>
+              </a:rPr>
+              <a:t>cchic </a:t>
+            </a:r>
+            <a:r>
+              <a:rPr sz="1800">
+                <a:solidFill>
+                  <a:srgbClr val="666666"/>
+                </a:solidFill>
+                <a:latin typeface="Courier"/>
+              </a:rPr>
+              <a:t>%&gt;%</a:t>
+            </a:r>
+            <a:br/>
+            <a:r>
+              <a:rPr sz="1800">
+                <a:solidFill>
+                  <a:srgbClr val="4070A0"/>
+                </a:solidFill>
+                <a:latin typeface="Courier"/>
+              </a:rPr>
+              <a:t>  </a:t>
+            </a:r>
+            <a:r>
+              <a:rPr sz="1800" b="1">
+                <a:solidFill>
+                  <a:srgbClr val="007020"/>
+                </a:solidFill>
+                <a:latin typeface="Courier"/>
+              </a:rPr>
+              <a:t>mutate</a:t>
+            </a:r>
+            <a:r>
+              <a:rPr sz="1800">
+                <a:latin typeface="Courier"/>
+              </a:rPr>
+              <a:t>(</a:t>
+            </a:r>
+            <a:r>
+              <a:rPr sz="1800">
+                <a:solidFill>
+                  <a:srgbClr val="902000"/>
+                </a:solidFill>
+                <a:latin typeface="Courier"/>
+              </a:rPr>
+              <a:t>los_num =</a:t>
+            </a:r>
+            <a:r>
+              <a:rPr sz="1800">
+                <a:latin typeface="Courier"/>
+              </a:rPr>
+              <a:t> </a:t>
+            </a:r>
+            <a:r>
+              <a:rPr sz="1800" b="1">
+                <a:solidFill>
+                  <a:srgbClr val="007020"/>
+                </a:solidFill>
+                <a:latin typeface="Courier"/>
+              </a:rPr>
+              <a:t>as.numeric</a:t>
+            </a:r>
+            <a:r>
+              <a:rPr sz="1800">
+                <a:latin typeface="Courier"/>
+              </a:rPr>
+              <a:t>(los))</a:t>
             </a:r>
           </a:p>
         </p:txBody>
@@ -12097,7 +12037,7 @@
             </a:pPr>
             <a:r>
               <a:rPr/>
-              <a:t>Using</a:t>
+              <a:t>Doing</a:t>
             </a:r>
             <a:r>
               <a:rPr/>
@@ -12113,22 +12053,6 @@
             </a:r>
             <a:r>
               <a:rPr/>
-              <a:t>Mann</a:t>
-            </a:r>
-            <a:r>
-              <a:rPr/>
-              <a:t> </a:t>
-            </a:r>
-            <a:r>
-              <a:rPr/>
-              <a:t>Whitney</a:t>
-            </a:r>
-            <a:r>
-              <a:rPr/>
-              <a:t> </a:t>
-            </a:r>
-            <a:r>
-              <a:rPr/>
               <a:t>test</a:t>
             </a:r>
           </a:p>
@@ -12155,83 +12079,9 @@
           <a:bodyPr/>
           <a:lstStyle/>
           <a:p>
-            <a:pPr lvl="0" marL="0" indent="0">
+            <a:pPr lvl="0" marL="1270000" indent="0">
               <a:buNone/>
             </a:pPr>
-            <a:r>
-              <a:rPr sz="1800">
-                <a:latin typeface="Courier"/>
-              </a:rPr>
-              <a:t>??Mann-Whitney</a:t>
-            </a:r>
-            <a:r>
-              <a:rPr/>
-              <a:t> will show you that the command is actually called </a:t>
-            </a:r>
-            <a:r>
-              <a:rPr sz="1800">
-                <a:latin typeface="Courier"/>
-              </a:rPr>
-              <a:t>wilcox.test</a:t>
-            </a:r>
-            <a:r>
-              <a:rPr/>
-              <a:t>.</a:t>
-            </a:r>
-          </a:p>
-          <a:p>
-            <a:pPr lvl="0" marL="0" indent="0">
-              <a:buNone/>
-            </a:pPr>
-            <a:r>
-              <a:rPr/>
-              <a:t>Both variables need to be in numeric format.</a:t>
-            </a:r>
-          </a:p>
-          <a:p>
-            <a:pPr lvl="0" marL="1270000" indent="0">
-              <a:buNone/>
-            </a:pPr>
-            <a:r>
-              <a:rPr sz="1800">
-                <a:latin typeface="Courier"/>
-              </a:rPr>
-              <a:t>cchic &lt;-</a:t>
-            </a:r>
-            <a:r>
-              <a:rPr sz="1800">
-                <a:solidFill>
-                  <a:srgbClr val="4070A0"/>
-                </a:solidFill>
-                <a:latin typeface="Courier"/>
-              </a:rPr>
-              <a:t> </a:t>
-            </a:r>
-            <a:r>
-              <a:rPr sz="1800">
-                <a:latin typeface="Courier"/>
-              </a:rPr>
-              <a:t>cchic </a:t>
-            </a:r>
-            <a:r>
-              <a:rPr sz="1800">
-                <a:solidFill>
-                  <a:srgbClr val="666666"/>
-                </a:solidFill>
-                <a:latin typeface="Courier"/>
-              </a:rPr>
-              <a:t>%&gt;%</a:t>
-            </a:r>
-            <a:br/>
-            <a:r>
-              <a:rPr sz="1800">
-                <a:solidFill>
-                  <a:srgbClr val="4070A0"/>
-                </a:solidFill>
-                <a:latin typeface="Courier"/>
-              </a:rPr>
-              <a:t>  </a:t>
-            </a:r>
             <a:r>
               <a:rPr sz="1800" b="1">
                 <a:solidFill>
@@ -12239,13 +12089,37 @@
                 </a:solidFill>
                 <a:latin typeface="Courier"/>
               </a:rPr>
-              <a:t>mutate</a:t>
-            </a:r>
-            <a:r>
-              <a:rPr sz="1800">
-                <a:latin typeface="Courier"/>
-              </a:rPr>
-              <a:t>(</a:t>
+              <a:t>wilcox.test</a:t>
+            </a:r>
+            <a:r>
+              <a:rPr sz="1800">
+                <a:latin typeface="Courier"/>
+              </a:rPr>
+              <a:t>(los_num </a:t>
+            </a:r>
+            <a:r>
+              <a:rPr sz="1800">
+                <a:solidFill>
+                  <a:srgbClr val="666666"/>
+                </a:solidFill>
+                <a:latin typeface="Courier"/>
+              </a:rPr>
+              <a:t>~</a:t>
+            </a:r>
+            <a:r>
+              <a:rPr sz="1800">
+                <a:solidFill>
+                  <a:srgbClr val="4070A0"/>
+                </a:solidFill>
+                <a:latin typeface="Courier"/>
+              </a:rPr>
+              <a:t> </a:t>
+            </a:r>
+            <a:r>
+              <a:rPr sz="1800">
+                <a:latin typeface="Courier"/>
+              </a:rPr>
+              <a:t>sex, </a:t>
             </a:r>
             <a:r>
               <a:rPr sz="1800">
@@ -12254,28 +12128,29 @@
                 </a:solidFill>
                 <a:latin typeface="Courier"/>
               </a:rPr>
-              <a:t>los_num =</a:t>
-            </a:r>
-            <a:r>
-              <a:rPr sz="1800">
-                <a:latin typeface="Courier"/>
-              </a:rPr>
-              <a:t> </a:t>
-            </a:r>
-            <a:r>
-              <a:rPr sz="1800" b="1">
-                <a:solidFill>
-                  <a:srgbClr val="007020"/>
-                </a:solidFill>
-                <a:latin typeface="Courier"/>
-              </a:rPr>
-              <a:t>as.numeric</a:t>
-            </a:r>
-            <a:r>
-              <a:rPr sz="1800">
-                <a:latin typeface="Courier"/>
-              </a:rPr>
-              <a:t>(los))</a:t>
+              <a:t>data =</a:t>
+            </a:r>
+            <a:r>
+              <a:rPr sz="1800">
+                <a:latin typeface="Courier"/>
+              </a:rPr>
+              <a:t> cchic)</a:t>
+            </a:r>
+          </a:p>
+          <a:p>
+            <a:pPr lvl="0" marL="1270000" indent="0">
+              <a:buNone/>
+            </a:pPr>
+            <a:r>
+              <a:rPr sz="1800">
+                <a:latin typeface="Courier"/>
+              </a:rPr>
+              <a:t>## 
+##  Wilcoxon rank sum test with continuity correction
+## 
+## data:  los_num by sex
+## W = 1334.5, p-value = 0.1713
+## alternative hypothesis: true location shift is not equal to 0</a:t>
             </a:r>
           </a:p>
         </p:txBody>
@@ -12328,163 +12203,6 @@
             </a:pPr>
             <a:r>
               <a:rPr/>
-              <a:t>Doing</a:t>
-            </a:r>
-            <a:r>
-              <a:rPr/>
-              <a:t> </a:t>
-            </a:r>
-            <a:r>
-              <a:rPr/>
-              <a:t>the</a:t>
-            </a:r>
-            <a:r>
-              <a:rPr/>
-              <a:t> </a:t>
-            </a:r>
-            <a:r>
-              <a:rPr/>
-              <a:t>test</a:t>
-            </a:r>
-          </a:p>
-        </p:txBody>
-      </p:sp>
-      <p:sp>
-        <p:nvSpPr>
-          <p:cNvPr id="3" name="Content Placeholder 2">
-            <a:extLst>
-              <a:ext uri="{FF2B5EF4-FFF2-40B4-BE49-F238E27FC236}">
-                <a16:creationId xmlns:a16="http://schemas.microsoft.com/office/drawing/2014/main" id="{D10DDA37-E46B-B641-BC9F-636CB92A2C08}"/>
-              </a:ext>
-            </a:extLst>
-          </p:cNvPr>
-          <p:cNvSpPr>
-            <a:spLocks noGrp="1"/>
-          </p:cNvSpPr>
-          <p:nvPr>
-            <p:ph idx="1"/>
-          </p:nvPr>
-        </p:nvSpPr>
-        <p:spPr/>
-        <p:txBody>
-          <a:bodyPr/>
-          <a:lstStyle/>
-          <a:p>
-            <a:pPr lvl="0" marL="1270000" indent="0">
-              <a:buNone/>
-            </a:pPr>
-            <a:r>
-              <a:rPr sz="1800" b="1">
-                <a:solidFill>
-                  <a:srgbClr val="007020"/>
-                </a:solidFill>
-                <a:latin typeface="Courier"/>
-              </a:rPr>
-              <a:t>wilcox.test</a:t>
-            </a:r>
-            <a:r>
-              <a:rPr sz="1800">
-                <a:latin typeface="Courier"/>
-              </a:rPr>
-              <a:t>(cchic</a:t>
-            </a:r>
-            <a:r>
-              <a:rPr sz="1800">
-                <a:solidFill>
-                  <a:srgbClr val="666666"/>
-                </a:solidFill>
-                <a:latin typeface="Courier"/>
-              </a:rPr>
-              <a:t>$</a:t>
-            </a:r>
-            <a:r>
-              <a:rPr sz="1800">
-                <a:latin typeface="Courier"/>
-              </a:rPr>
-              <a:t>los_num, cchic</a:t>
-            </a:r>
-            <a:r>
-              <a:rPr sz="1800">
-                <a:solidFill>
-                  <a:srgbClr val="666666"/>
-                </a:solidFill>
-                <a:latin typeface="Courier"/>
-              </a:rPr>
-              <a:t>$</a:t>
-            </a:r>
-            <a:r>
-              <a:rPr sz="1800">
-                <a:latin typeface="Courier"/>
-              </a:rPr>
-              <a:t>gender_num)</a:t>
-            </a:r>
-          </a:p>
-          <a:p>
-            <a:pPr lvl="0" marL="1270000" indent="0">
-              <a:buNone/>
-            </a:pPr>
-            <a:r>
-              <a:rPr sz="1800">
-                <a:latin typeface="Courier"/>
-              </a:rPr>
-              <a:t>## 
-##  Wilcoxon rank sum test with continuity correction
-## 
-## data:  cchic$los_num and cchic$gender_num
-## W = 6950, p-value = 3.241e-08
-## alternative hypothesis: true location shift is not equal to 0</a:t>
-            </a:r>
-          </a:p>
-        </p:txBody>
-      </p:sp>
-    </p:spTree>
-  </p:cSld>
-</p:sld>
-</file>
-
-<file path=ppt/slides/slide44.xml><?xml version="1.0" encoding="utf-8"?>
-<p:sld xmlns:a="http://schemas.openxmlformats.org/drawingml/2006/main" xmlns:r="http://schemas.openxmlformats.org/officeDocument/2006/relationships" xmlns:p="http://schemas.openxmlformats.org/presentationml/2006/main">
-  <p:cSld>
-    <p:spTree>
-      <p:nvGrpSpPr>
-        <p:cNvPr id="1" name=""/>
-        <p:cNvGrpSpPr/>
-        <p:nvPr/>
-      </p:nvGrpSpPr>
-      <p:grpSpPr>
-        <a:xfrm>
-          <a:off x="0" y="0"/>
-          <a:ext cx="0" cy="0"/>
-          <a:chOff x="0" y="0"/>
-          <a:chExt cx="0" cy="0"/>
-        </a:xfrm>
-      </p:grpSpPr>
-      <p:sp>
-        <p:nvSpPr>
-          <p:cNvPr id="2" name="Title 1">
-            <a:extLst>
-              <a:ext uri="{FF2B5EF4-FFF2-40B4-BE49-F238E27FC236}">
-                <a16:creationId xmlns:a16="http://schemas.microsoft.com/office/drawing/2014/main" id="{5567D468-EE70-CD4E-A3AC-039CC11EF1FB}"/>
-              </a:ext>
-            </a:extLst>
-          </p:cNvPr>
-          <p:cNvSpPr>
-            <a:spLocks noGrp="1"/>
-          </p:cNvSpPr>
-          <p:nvPr>
-            <p:ph type="title"/>
-          </p:nvPr>
-        </p:nvSpPr>
-        <p:spPr/>
-        <p:txBody>
-          <a:bodyPr/>
-          <a:lstStyle/>
-          <a:p>
-            <a:pPr lvl="0" marL="0" indent="0">
-              <a:buNone/>
-            </a:pPr>
-            <a:r>
-              <a:rPr/>
               <a:t>Lunch</a:t>
             </a:r>
           </a:p>
@@ -13031,7 +12749,7 @@
       </p:sp>
       <p:pic>
         <p:nvPicPr>
-          <p:cNvPr descr="Images/ContinuousDistribution.png" id="0" name="Picture 1"/>
+          <p:cNvPr descr="../Images/ContinuousDistribution.png" id="0" name="Picture 1"/>
           <p:cNvPicPr>
             <a:picLocks noGrp="1" noChangeAspect="1"/>
           </p:cNvPicPr>
@@ -13146,7 +12864,7 @@
       </p:sp>
       <p:pic>
         <p:nvPicPr>
-          <p:cNvPr descr="Images/NormalDistribution.png" id="0" name="Picture 1"/>
+          <p:cNvPr descr="../Images/NormalDistribution.png" id="0" name="Picture 1"/>
           <p:cNvPicPr>
             <a:picLocks noGrp="1" noChangeAspect="1"/>
           </p:cNvPicPr>

</xml_diff>

<commit_message>
edited bar graphs. Added synthetic data.
</commit_message>
<xml_diff>
--- a/Workshops/Workshop6.pptx
+++ b/Workshops/Workshop6.pptx
@@ -8173,7 +8173,7 @@
             </a:r>
             <a:r>
               <a:rPr/>
-              <a:t> argument tells R to ignore missing values in the variable. What happens if you leave it out?</a:t>
+              <a:t> argument tells R to ignore missing values in the variable.</a:t>
             </a:r>
           </a:p>
         </p:txBody>
@@ -8626,7 +8626,7 @@
               <a:rPr sz="1800">
                 <a:latin typeface="Courier"/>
               </a:rPr>
-              <a:t>medical)</a:t>
+              <a:t>vital_status)</a:t>
             </a:r>
           </a:p>
           <a:p>
@@ -8638,8 +8638,8 @@
                 <a:latin typeface="Courier"/>
               </a:rPr>
               <a:t>## 
-##    0    1 
-## 2542 2458</a:t>
+##    A    D 
+## 4444  556</a:t>
             </a:r>
           </a:p>
           <a:p>
@@ -8657,7 +8657,7 @@
               <a:rPr sz="1800">
                 <a:latin typeface="Courier"/>
               </a:rPr>
-              <a:t>type &lt;-</a:t>
+              <a:t>status &lt;-</a:t>
             </a:r>
             <a:r>
               <a:rPr sz="1800">
@@ -8696,7 +8696,7 @@
               <a:rPr sz="1800">
                 <a:latin typeface="Courier"/>
               </a:rPr>
-              <a:t>medical)</a:t>
+              <a:t>vital_status)</a:t>
             </a:r>
             <a:br/>
             <a:r>
@@ -8712,7 +8712,7 @@
               <a:rPr sz="1800">
                 <a:latin typeface="Courier"/>
               </a:rPr>
-              <a:t>(type)</a:t>
+              <a:t>(status)</a:t>
             </a:r>
           </a:p>
           <a:p>
@@ -8724,8 +8724,8 @@
                 <a:latin typeface="Courier"/>
               </a:rPr>
               <a:t>## 
-##      0      1 
-## 0.5084 0.4916</a:t>
+##      A      D 
+## 0.8888 0.1112</a:t>
             </a:r>
           </a:p>
         </p:txBody>

</xml_diff>